<commit_message>
20/02/14 add 3.1,3.2, abstract
</commit_message>
<xml_diff>
--- a/extra/taintanalysis.pptx
+++ b/extra/taintanalysis.pptx
@@ -12,11 +12,12 @@
     <p:sldId id="319" r:id="rId6"/>
     <p:sldId id="320" r:id="rId7"/>
     <p:sldId id="321" r:id="rId8"/>
+    <p:sldId id="322" r:id="rId9"/>
   </p:sldIdLst>
   <p:sldSz cx="12192000" cy="6858000"/>
   <p:notesSz cx="6858000" cy="9144000"/>
   <p:custDataLst>
-    <p:tags r:id="rId9"/>
+    <p:tags r:id="rId10"/>
   </p:custDataLst>
   <p:defaultTextStyle>
     <a:defPPr>
@@ -7326,6 +7327,409 @@
 </p:sld>
 </file>
 
+<file path=ppt/slides/slide8.xml><?xml version="1.0" encoding="utf-8"?>
+<p:sld xmlns:a="http://schemas.openxmlformats.org/drawingml/2006/main" xmlns:r="http://schemas.openxmlformats.org/officeDocument/2006/relationships" xmlns:p="http://schemas.openxmlformats.org/presentationml/2006/main">
+  <p:cSld>
+    <p:spTree>
+      <p:nvGrpSpPr>
+        <p:cNvPr id="1" name=""/>
+        <p:cNvGrpSpPr/>
+        <p:nvPr/>
+      </p:nvGrpSpPr>
+      <p:grpSpPr>
+        <a:xfrm>
+          <a:off x="0" y="0"/>
+          <a:ext cx="0" cy="0"/>
+          <a:chOff x="0" y="0"/>
+          <a:chExt cx="0" cy="0"/>
+        </a:xfrm>
+      </p:grpSpPr>
+      <p:sp>
+        <p:nvSpPr>
+          <p:cNvPr id="3" name="文本框 2">
+            <a:extLst>
+              <a:ext uri="{FF2B5EF4-FFF2-40B4-BE49-F238E27FC236}">
+                <a16:creationId xmlns:a16="http://schemas.microsoft.com/office/drawing/2014/main" id="{8F989A70-4894-4BC6-8E4D-1C13976B7500}"/>
+              </a:ext>
+            </a:extLst>
+          </p:cNvPr>
+          <p:cNvSpPr txBox="1"/>
+          <p:nvPr/>
+        </p:nvSpPr>
+        <p:spPr>
+          <a:xfrm>
+            <a:off x="2340851" y="4860552"/>
+            <a:ext cx="7785371" cy="1477328"/>
+          </a:xfrm>
+          <a:prstGeom prst="rect">
+            <a:avLst/>
+          </a:prstGeom>
+          <a:noFill/>
+          <a:ln w="19050">
+            <a:solidFill>
+              <a:schemeClr val="tx1"/>
+            </a:solidFill>
+          </a:ln>
+        </p:spPr>
+        <p:txBody>
+          <a:bodyPr wrap="square" rtlCol="0">
+            <a:spAutoFit/>
+          </a:bodyPr>
+          <a:lstStyle/>
+          <a:p>
+            <a:r>
+              <a:rPr lang="en-US" altLang="zh-CN" dirty="0"/>
+              <a:t>arrayload 1[3]</a:t>
+            </a:r>
+          </a:p>
+          <a:p>
+            <a:r>
+              <a:rPr lang="en-US" altLang="zh-CN" dirty="0"/>
+              <a:t>inst:8 = invokevirtual &lt; String, replace(CharSequence; CharSequence;) String; </a:t>
+            </a:r>
+          </a:p>
+          <a:p>
+            <a:r>
+              <a:rPr lang="en-US" altLang="zh-CN" dirty="0"/>
+              <a:t>inst:12 = invokevirtual &lt; String, replace(CharSequence; CharSequence;) String; </a:t>
+            </a:r>
+          </a:p>
+          <a:p>
+            <a:r>
+              <a:rPr lang="en-US" altLang="zh-CN" dirty="0"/>
+              <a:t>inst:13 = getstatic &lt; System, out, &lt;PrintStream&gt; &gt;</a:t>
+            </a:r>
+          </a:p>
+          <a:p>
+            <a:r>
+              <a:rPr lang="en-US" altLang="zh-CN" dirty="0"/>
+              <a:t>inst:invokevirtual &lt; Application, PrintStream, println(String;)V &gt;</a:t>
+            </a:r>
+            <a:endParaRPr lang="zh-CN" altLang="en-US" dirty="0"/>
+          </a:p>
+        </p:txBody>
+      </p:sp>
+      <p:sp>
+        <p:nvSpPr>
+          <p:cNvPr id="4" name="矩形 3">
+            <a:extLst>
+              <a:ext uri="{FF2B5EF4-FFF2-40B4-BE49-F238E27FC236}">
+                <a16:creationId xmlns:a16="http://schemas.microsoft.com/office/drawing/2014/main" id="{9586400C-C4E0-4AA4-89A1-35139BB91C4B}"/>
+              </a:ext>
+            </a:extLst>
+          </p:cNvPr>
+          <p:cNvSpPr/>
+          <p:nvPr/>
+        </p:nvSpPr>
+        <p:spPr>
+          <a:xfrm>
+            <a:off x="5820322" y="2372259"/>
+            <a:ext cx="5204297" cy="1477328"/>
+          </a:xfrm>
+          <a:prstGeom prst="rect">
+            <a:avLst/>
+          </a:prstGeom>
+          <a:ln w="19050">
+            <a:solidFill>
+              <a:schemeClr val="tx1"/>
+            </a:solidFill>
+          </a:ln>
+        </p:spPr>
+        <p:txBody>
+          <a:bodyPr wrap="square">
+            <a:spAutoFit/>
+          </a:bodyPr>
+          <a:lstStyle/>
+          <a:p>
+            <a:r>
+              <a:rPr lang="zh-CN" altLang="en-US" dirty="0"/>
+              <a:t>Ljava/lang/Object :: v4 = p1 $args [#(0)]::</a:t>
+            </a:r>
+          </a:p>
+          <a:p>
+            <a:r>
+              <a:rPr lang="zh-CN" altLang="en-US" dirty="0"/>
+              <a:t>Ljava/lang/String :: v8 = v4.replace(#(&lt;), #(&amp;lt))::</a:t>
+            </a:r>
+          </a:p>
+          <a:p>
+            <a:r>
+              <a:rPr lang="zh-CN" altLang="en-US" dirty="0"/>
+              <a:t>Ljava/lang/String :: v12 = v8.replace(#(&gt;), #(&amp;gt))::</a:t>
+            </a:r>
+          </a:p>
+          <a:p>
+            <a:r>
+              <a:rPr lang="zh-CN" altLang="en-US" dirty="0"/>
+              <a:t>Ljava/io/PrintStream :: v13 = java.lang.System.out::</a:t>
+            </a:r>
+          </a:p>
+          <a:p>
+            <a:r>
+              <a:rPr lang="zh-CN" altLang="en-US" dirty="0"/>
+              <a:t>V :: v13.println(v12)::</a:t>
+            </a:r>
+          </a:p>
+        </p:txBody>
+      </p:sp>
+      <p:graphicFrame>
+        <p:nvGraphicFramePr>
+          <p:cNvPr id="5" name="表格 10">
+            <a:extLst>
+              <a:ext uri="{FF2B5EF4-FFF2-40B4-BE49-F238E27FC236}">
+                <a16:creationId xmlns:a16="http://schemas.microsoft.com/office/drawing/2014/main" id="{9A9C5382-5C10-4912-8886-184D0FCE8EF6}"/>
+              </a:ext>
+            </a:extLst>
+          </p:cNvPr>
+          <p:cNvGraphicFramePr>
+            <a:graphicFrameLocks noGrp="1"/>
+          </p:cNvGraphicFramePr>
+          <p:nvPr>
+            <p:extLst>
+              <p:ext uri="{D42A27DB-BD31-4B8C-83A1-F6EECF244321}">
+                <p14:modId xmlns:p14="http://schemas.microsoft.com/office/powerpoint/2010/main" val="415713978"/>
+              </p:ext>
+            </p:extLst>
+          </p:nvPr>
+        </p:nvGraphicFramePr>
+        <p:xfrm>
+          <a:off x="1167381" y="2235899"/>
+          <a:ext cx="3795747" cy="1483360"/>
+        </p:xfrm>
+        <a:graphic>
+          <a:graphicData uri="http://schemas.openxmlformats.org/drawingml/2006/table">
+            <a:tbl>
+              <a:tblPr firstRow="1" bandRow="1">
+                <a:tableStyleId>{5940675A-B579-460E-94D1-54222C63F5DA}</a:tableStyleId>
+              </a:tblPr>
+              <a:tblGrid>
+                <a:gridCol w="399003">
+                  <a:extLst>
+                    <a:ext uri="{9D8B030D-6E8A-4147-A177-3AD203B41FA5}">
+                      <a16:colId xmlns:a16="http://schemas.microsoft.com/office/drawing/2014/main" val="1401639486"/>
+                    </a:ext>
+                  </a:extLst>
+                </a:gridCol>
+                <a:gridCol w="3396744">
+                  <a:extLst>
+                    <a:ext uri="{9D8B030D-6E8A-4147-A177-3AD203B41FA5}">
+                      <a16:colId xmlns:a16="http://schemas.microsoft.com/office/drawing/2014/main" val="1095208800"/>
+                    </a:ext>
+                  </a:extLst>
+                </a:gridCol>
+              </a:tblGrid>
+              <a:tr h="370840">
+                <a:tc>
+                  <a:txBody>
+                    <a:bodyPr/>
+                    <a:lstStyle/>
+                    <a:p>
+                      <a:pPr algn="ctr"/>
+                      <a:r>
+                        <a:rPr lang="en-US" altLang="zh-CN" dirty="0"/>
+                        <a:t>1</a:t>
+                      </a:r>
+                      <a:endParaRPr lang="zh-CN" altLang="en-US" dirty="0"/>
+                    </a:p>
+                  </a:txBody>
+                  <a:tcPr/>
+                </a:tc>
+                <a:tc>
+                  <a:txBody>
+                    <a:bodyPr/>
+                    <a:lstStyle/>
+                    <a:p>
+                      <a:r>
+                        <a:rPr lang="en-US" altLang="zh-CN" dirty="0"/>
+                        <a:t>String arg=args[0];</a:t>
+                      </a:r>
+                      <a:endParaRPr lang="zh-CN" altLang="en-US" dirty="0"/>
+                    </a:p>
+                  </a:txBody>
+                  <a:tcPr/>
+                </a:tc>
+                <a:extLst>
+                  <a:ext uri="{0D108BD9-81ED-4DB2-BD59-A6C34878D82A}">
+                    <a16:rowId xmlns:a16="http://schemas.microsoft.com/office/drawing/2014/main" val="3363482117"/>
+                  </a:ext>
+                </a:extLst>
+              </a:tr>
+              <a:tr h="370840">
+                <a:tc>
+                  <a:txBody>
+                    <a:bodyPr/>
+                    <a:lstStyle/>
+                    <a:p>
+                      <a:pPr algn="ctr"/>
+                      <a:r>
+                        <a:rPr lang="en-US" altLang="zh-CN" dirty="0"/>
+                        <a:t>2</a:t>
+                      </a:r>
+                      <a:endParaRPr lang="zh-CN" altLang="en-US" dirty="0"/>
+                    </a:p>
+                  </a:txBody>
+                  <a:tcPr/>
+                </a:tc>
+                <a:tc>
+                  <a:txBody>
+                    <a:bodyPr/>
+                    <a:lstStyle/>
+                    <a:p>
+                      <a:pPr marL="0" marR="0" lvl="0" indent="0" algn="l" defTabSz="914400" rtl="0" eaLnBrk="1" fontAlgn="auto" latinLnBrk="0" hangingPunct="1">
+                        <a:lnSpc>
+                          <a:spcPct val="100000"/>
+                        </a:lnSpc>
+                        <a:spcBef>
+                          <a:spcPts val="0"/>
+                        </a:spcBef>
+                        <a:spcAft>
+                          <a:spcPts val="0"/>
+                        </a:spcAft>
+                        <a:buClrTx/>
+                        <a:buSzTx/>
+                        <a:buFontTx/>
+                        <a:buNone/>
+                        <a:tabLst/>
+                        <a:defRPr/>
+                      </a:pPr>
+                      <a:r>
+                        <a:rPr lang="en-US" altLang="zh-CN" dirty="0"/>
+                        <a:t>arg=arg.replace("&lt;","&amp;lt")</a:t>
+                      </a:r>
+                      <a:endParaRPr lang="zh-CN" altLang="en-US" dirty="0"/>
+                    </a:p>
+                  </a:txBody>
+                  <a:tcPr/>
+                </a:tc>
+                <a:extLst>
+                  <a:ext uri="{0D108BD9-81ED-4DB2-BD59-A6C34878D82A}">
+                    <a16:rowId xmlns:a16="http://schemas.microsoft.com/office/drawing/2014/main" val="1306433519"/>
+                  </a:ext>
+                </a:extLst>
+              </a:tr>
+              <a:tr h="370840">
+                <a:tc>
+                  <a:txBody>
+                    <a:bodyPr/>
+                    <a:lstStyle/>
+                    <a:p>
+                      <a:pPr algn="ctr"/>
+                      <a:r>
+                        <a:rPr lang="en-US" altLang="zh-CN" dirty="0"/>
+                        <a:t>3</a:t>
+                      </a:r>
+                      <a:endParaRPr lang="zh-CN" altLang="en-US" dirty="0"/>
+                    </a:p>
+                  </a:txBody>
+                  <a:tcPr/>
+                </a:tc>
+                <a:tc>
+                  <a:txBody>
+                    <a:bodyPr/>
+                    <a:lstStyle/>
+                    <a:p>
+                      <a:pPr marL="0" marR="0" lvl="0" indent="0" algn="l" defTabSz="914400" rtl="0" eaLnBrk="1" fontAlgn="auto" latinLnBrk="0" hangingPunct="1">
+                        <a:lnSpc>
+                          <a:spcPct val="100000"/>
+                        </a:lnSpc>
+                        <a:spcBef>
+                          <a:spcPts val="0"/>
+                        </a:spcBef>
+                        <a:spcAft>
+                          <a:spcPts val="0"/>
+                        </a:spcAft>
+                        <a:buClrTx/>
+                        <a:buSzTx/>
+                        <a:buFontTx/>
+                        <a:buNone/>
+                        <a:tabLst/>
+                        <a:defRPr/>
+                      </a:pPr>
+                      <a:r>
+                        <a:rPr lang="en-US" altLang="zh-CN" dirty="0"/>
+                        <a:t>arg=arg.replace("&gt;","&amp;gt");</a:t>
+                      </a:r>
+                      <a:endParaRPr lang="zh-CN" altLang="en-US" dirty="0"/>
+                    </a:p>
+                  </a:txBody>
+                  <a:tcPr/>
+                </a:tc>
+                <a:extLst>
+                  <a:ext uri="{0D108BD9-81ED-4DB2-BD59-A6C34878D82A}">
+                    <a16:rowId xmlns:a16="http://schemas.microsoft.com/office/drawing/2014/main" val="2870147799"/>
+                  </a:ext>
+                </a:extLst>
+              </a:tr>
+              <a:tr h="370840">
+                <a:tc>
+                  <a:txBody>
+                    <a:bodyPr/>
+                    <a:lstStyle/>
+                    <a:p>
+                      <a:pPr algn="ctr"/>
+                      <a:r>
+                        <a:rPr lang="en-US" altLang="zh-CN" dirty="0"/>
+                        <a:t>4</a:t>
+                      </a:r>
+                      <a:endParaRPr lang="zh-CN" altLang="en-US" dirty="0"/>
+                    </a:p>
+                  </a:txBody>
+                  <a:tcPr/>
+                </a:tc>
+                <a:tc>
+                  <a:txBody>
+                    <a:bodyPr/>
+                    <a:lstStyle/>
+                    <a:p>
+                      <a:pPr marL="0" marR="0" lvl="0" indent="0" algn="l" defTabSz="914400" rtl="0" eaLnBrk="1" fontAlgn="auto" latinLnBrk="0" hangingPunct="1">
+                        <a:lnSpc>
+                          <a:spcPct val="100000"/>
+                        </a:lnSpc>
+                        <a:spcBef>
+                          <a:spcPts val="0"/>
+                        </a:spcBef>
+                        <a:spcAft>
+                          <a:spcPts val="0"/>
+                        </a:spcAft>
+                        <a:buClrTx/>
+                        <a:buSzTx/>
+                        <a:buFontTx/>
+                        <a:buNone/>
+                        <a:tabLst/>
+                        <a:defRPr/>
+                      </a:pPr>
+                      <a:r>
+                        <a:rPr lang="en-US" altLang="zh-CN" dirty="0"/>
+                        <a:t>System.out.println(arg);</a:t>
+                      </a:r>
+                      <a:endParaRPr lang="zh-CN" altLang="en-US" dirty="0"/>
+                    </a:p>
+                  </a:txBody>
+                  <a:tcPr/>
+                </a:tc>
+                <a:extLst>
+                  <a:ext uri="{0D108BD9-81ED-4DB2-BD59-A6C34878D82A}">
+                    <a16:rowId xmlns:a16="http://schemas.microsoft.com/office/drawing/2014/main" val="3578168134"/>
+                  </a:ext>
+                </a:extLst>
+              </a:tr>
+            </a:tbl>
+          </a:graphicData>
+        </a:graphic>
+      </p:graphicFrame>
+    </p:spTree>
+    <p:extLst>
+      <p:ext uri="{BB962C8B-B14F-4D97-AF65-F5344CB8AC3E}">
+        <p14:creationId xmlns:p14="http://schemas.microsoft.com/office/powerpoint/2010/main" val="1621731140"/>
+      </p:ext>
+    </p:extLst>
+  </p:cSld>
+  <p:clrMapOvr>
+    <a:masterClrMapping/>
+  </p:clrMapOvr>
+</p:sld>
+</file>
+
 <file path=ppt/tags/tag1.xml><?xml version="1.0" encoding="utf-8"?>
 <p:tagLst xmlns:a="http://schemas.openxmlformats.org/drawingml/2006/main" xmlns:r="http://schemas.openxmlformats.org/officeDocument/2006/relationships" xmlns:p="http://schemas.openxmlformats.org/presentationml/2006/main">
   <p:tag name="ISLIDE.GUIDESSETTING" val="{&quot;Id&quot;:null,&quot;Name&quot;:&quot;无&quot;,&quot;HeaderHeight&quot;:0.0,&quot;FooterHeight&quot;:0.0,&quot;SideMargin&quot;:0.0,&quot;TopMargin&quot;:0.0,&quot;BottomMargin&quot;:0.0,&quot;IntervalMargin&quot;:0.0,&quot;SettingType&quot;:&quot;System&quot;}"/>

</xml_diff>

<commit_message>
20/04/11 fix some bib & sec2 png2pdf & code2figure
</commit_message>
<xml_diff>
--- a/extra/taintanalysis.pptx
+++ b/extra/taintanalysis.pptx
@@ -5,19 +5,18 @@
     <p:sldMasterId id="2147483648" r:id="rId1"/>
   </p:sldMasterIdLst>
   <p:sldIdLst>
-    <p:sldId id="256" r:id="rId2"/>
-    <p:sldId id="316" r:id="rId3"/>
-    <p:sldId id="317" r:id="rId4"/>
-    <p:sldId id="318" r:id="rId5"/>
-    <p:sldId id="319" r:id="rId6"/>
-    <p:sldId id="320" r:id="rId7"/>
-    <p:sldId id="321" r:id="rId8"/>
-    <p:sldId id="322" r:id="rId9"/>
+    <p:sldId id="316" r:id="rId2"/>
+    <p:sldId id="317" r:id="rId3"/>
+    <p:sldId id="318" r:id="rId4"/>
+    <p:sldId id="319" r:id="rId5"/>
+    <p:sldId id="323" r:id="rId6"/>
+    <p:sldId id="324" r:id="rId7"/>
+    <p:sldId id="322" r:id="rId8"/>
   </p:sldIdLst>
   <p:sldSz cx="12192000" cy="6858000"/>
   <p:notesSz cx="6858000" cy="9144000"/>
   <p:custDataLst>
-    <p:tags r:id="rId10"/>
+    <p:tags r:id="rId9"/>
   </p:custDataLst>
   <p:defaultTextStyle>
     <a:defPPr>
@@ -269,7 +268,7 @@
           <a:p>
             <a:fld id="{20B0F5EE-308F-4E3B-B460-311D9DED5599}" type="datetimeFigureOut">
               <a:rPr lang="zh-CN" altLang="en-US" smtClean="0"/>
-              <a:t>2020/2/9</a:t>
+              <a:t>2020/4/11</a:t>
             </a:fld>
             <a:endParaRPr lang="zh-CN" altLang="en-US"/>
           </a:p>
@@ -467,7 +466,7 @@
           <a:p>
             <a:fld id="{20B0F5EE-308F-4E3B-B460-311D9DED5599}" type="datetimeFigureOut">
               <a:rPr lang="zh-CN" altLang="en-US" smtClean="0"/>
-              <a:t>2020/2/9</a:t>
+              <a:t>2020/4/11</a:t>
             </a:fld>
             <a:endParaRPr lang="zh-CN" altLang="en-US"/>
           </a:p>
@@ -675,7 +674,7 @@
           <a:p>
             <a:fld id="{20B0F5EE-308F-4E3B-B460-311D9DED5599}" type="datetimeFigureOut">
               <a:rPr lang="zh-CN" altLang="en-US" smtClean="0"/>
-              <a:t>2020/2/9</a:t>
+              <a:t>2020/4/11</a:t>
             </a:fld>
             <a:endParaRPr lang="zh-CN" altLang="en-US"/>
           </a:p>
@@ -873,7 +872,7 @@
           <a:p>
             <a:fld id="{20B0F5EE-308F-4E3B-B460-311D9DED5599}" type="datetimeFigureOut">
               <a:rPr lang="zh-CN" altLang="en-US" smtClean="0"/>
-              <a:t>2020/2/9</a:t>
+              <a:t>2020/4/11</a:t>
             </a:fld>
             <a:endParaRPr lang="zh-CN" altLang="en-US"/>
           </a:p>
@@ -1148,7 +1147,7 @@
           <a:p>
             <a:fld id="{20B0F5EE-308F-4E3B-B460-311D9DED5599}" type="datetimeFigureOut">
               <a:rPr lang="zh-CN" altLang="en-US" smtClean="0"/>
-              <a:t>2020/2/9</a:t>
+              <a:t>2020/4/11</a:t>
             </a:fld>
             <a:endParaRPr lang="zh-CN" altLang="en-US"/>
           </a:p>
@@ -1413,7 +1412,7 @@
           <a:p>
             <a:fld id="{20B0F5EE-308F-4E3B-B460-311D9DED5599}" type="datetimeFigureOut">
               <a:rPr lang="zh-CN" altLang="en-US" smtClean="0"/>
-              <a:t>2020/2/9</a:t>
+              <a:t>2020/4/11</a:t>
             </a:fld>
             <a:endParaRPr lang="zh-CN" altLang="en-US"/>
           </a:p>
@@ -1825,7 +1824,7 @@
           <a:p>
             <a:fld id="{20B0F5EE-308F-4E3B-B460-311D9DED5599}" type="datetimeFigureOut">
               <a:rPr lang="zh-CN" altLang="en-US" smtClean="0"/>
-              <a:t>2020/2/9</a:t>
+              <a:t>2020/4/11</a:t>
             </a:fld>
             <a:endParaRPr lang="zh-CN" altLang="en-US"/>
           </a:p>
@@ -1966,7 +1965,7 @@
           <a:p>
             <a:fld id="{20B0F5EE-308F-4E3B-B460-311D9DED5599}" type="datetimeFigureOut">
               <a:rPr lang="zh-CN" altLang="en-US" smtClean="0"/>
-              <a:t>2020/2/9</a:t>
+              <a:t>2020/4/11</a:t>
             </a:fld>
             <a:endParaRPr lang="zh-CN" altLang="en-US"/>
           </a:p>
@@ -2079,7 +2078,7 @@
           <a:p>
             <a:fld id="{20B0F5EE-308F-4E3B-B460-311D9DED5599}" type="datetimeFigureOut">
               <a:rPr lang="zh-CN" altLang="en-US" smtClean="0"/>
-              <a:t>2020/2/9</a:t>
+              <a:t>2020/4/11</a:t>
             </a:fld>
             <a:endParaRPr lang="zh-CN" altLang="en-US"/>
           </a:p>
@@ -2390,7 +2389,7 @@
           <a:p>
             <a:fld id="{20B0F5EE-308F-4E3B-B460-311D9DED5599}" type="datetimeFigureOut">
               <a:rPr lang="zh-CN" altLang="en-US" smtClean="0"/>
-              <a:t>2020/2/9</a:t>
+              <a:t>2020/4/11</a:t>
             </a:fld>
             <a:endParaRPr lang="zh-CN" altLang="en-US"/>
           </a:p>
@@ -2678,7 +2677,7 @@
           <a:p>
             <a:fld id="{20B0F5EE-308F-4E3B-B460-311D9DED5599}" type="datetimeFigureOut">
               <a:rPr lang="zh-CN" altLang="en-US" smtClean="0"/>
-              <a:t>2020/2/9</a:t>
+              <a:t>2020/4/11</a:t>
             </a:fld>
             <a:endParaRPr lang="zh-CN" altLang="en-US"/>
           </a:p>
@@ -2919,7 +2918,7 @@
           <a:p>
             <a:fld id="{20B0F5EE-308F-4E3B-B460-311D9DED5599}" type="datetimeFigureOut">
               <a:rPr lang="zh-CN" altLang="en-US" smtClean="0"/>
-              <a:t>2020/2/9</a:t>
+              <a:t>2020/4/11</a:t>
             </a:fld>
             <a:endParaRPr lang="zh-CN" altLang="en-US"/>
           </a:p>
@@ -3338,86 +3337,6 @@
       </p:grpSpPr>
       <p:sp>
         <p:nvSpPr>
-          <p:cNvPr id="2" name="标题 1">
-            <a:extLst>
-              <a:ext uri="{FF2B5EF4-FFF2-40B4-BE49-F238E27FC236}">
-                <a16:creationId xmlns:a16="http://schemas.microsoft.com/office/drawing/2014/main" id="{BE15A73B-376D-43A2-A0E2-57C5F65F2727}"/>
-              </a:ext>
-            </a:extLst>
-          </p:cNvPr>
-          <p:cNvSpPr>
-            <a:spLocks noGrp="1"/>
-          </p:cNvSpPr>
-          <p:nvPr>
-            <p:ph type="ctrTitle"/>
-          </p:nvPr>
-        </p:nvSpPr>
-        <p:spPr/>
-        <p:txBody>
-          <a:bodyPr/>
-          <a:lstStyle/>
-          <a:p>
-            <a:endParaRPr lang="zh-CN" altLang="en-US"/>
-          </a:p>
-        </p:txBody>
-      </p:sp>
-      <p:sp>
-        <p:nvSpPr>
-          <p:cNvPr id="3" name="副标题 2">
-            <a:extLst>
-              <a:ext uri="{FF2B5EF4-FFF2-40B4-BE49-F238E27FC236}">
-                <a16:creationId xmlns:a16="http://schemas.microsoft.com/office/drawing/2014/main" id="{745D8757-D8AD-484D-ACA7-2D5722D0B20F}"/>
-              </a:ext>
-            </a:extLst>
-          </p:cNvPr>
-          <p:cNvSpPr>
-            <a:spLocks noGrp="1"/>
-          </p:cNvSpPr>
-          <p:nvPr>
-            <p:ph type="subTitle" idx="1"/>
-          </p:nvPr>
-        </p:nvSpPr>
-        <p:spPr/>
-        <p:txBody>
-          <a:bodyPr/>
-          <a:lstStyle/>
-          <a:p>
-            <a:endParaRPr lang="zh-CN" altLang="en-US"/>
-          </a:p>
-        </p:txBody>
-      </p:sp>
-    </p:spTree>
-    <p:extLst>
-      <p:ext uri="{BB962C8B-B14F-4D97-AF65-F5344CB8AC3E}">
-        <p14:creationId xmlns:p14="http://schemas.microsoft.com/office/powerpoint/2010/main" val="2313746955"/>
-      </p:ext>
-    </p:extLst>
-  </p:cSld>
-  <p:clrMapOvr>
-    <a:masterClrMapping/>
-  </p:clrMapOvr>
-</p:sld>
-</file>
-
-<file path=ppt/slides/slide2.xml><?xml version="1.0" encoding="utf-8"?>
-<p:sld xmlns:a="http://schemas.openxmlformats.org/drawingml/2006/main" xmlns:r="http://schemas.openxmlformats.org/officeDocument/2006/relationships" xmlns:p="http://schemas.openxmlformats.org/presentationml/2006/main">
-  <p:cSld>
-    <p:spTree>
-      <p:nvGrpSpPr>
-        <p:cNvPr id="1" name=""/>
-        <p:cNvGrpSpPr/>
-        <p:nvPr/>
-      </p:nvGrpSpPr>
-      <p:grpSpPr>
-        <a:xfrm>
-          <a:off x="0" y="0"/>
-          <a:ext cx="0" cy="0"/>
-          <a:chOff x="0" y="0"/>
-          <a:chExt cx="0" cy="0"/>
-        </a:xfrm>
-      </p:grpSpPr>
-      <p:sp>
-        <p:nvSpPr>
           <p:cNvPr id="3" name="页脚占位符 2">
             <a:extLst>
               <a:ext uri="{FF2B5EF4-FFF2-40B4-BE49-F238E27FC236}">
@@ -3469,7 +3388,7 @@
             <a:fld id="{5DD3DB80-B894-403A-B48E-6FDC1A72010E}" type="slidenum">
               <a:rPr lang="zh-CN" altLang="en-US" smtClean="0"/>
               <a:pPr/>
-              <a:t>2</a:t>
+              <a:t>1</a:t>
             </a:fld>
             <a:endParaRPr lang="zh-CN" altLang="en-US"/>
           </a:p>
@@ -3490,13 +3409,13 @@
           <p:nvPr>
             <p:extLst>
               <p:ext uri="{D42A27DB-BD31-4B8C-83A1-F6EECF244321}">
-                <p14:modId xmlns:p14="http://schemas.microsoft.com/office/powerpoint/2010/main" val="798869985"/>
+                <p14:modId xmlns:p14="http://schemas.microsoft.com/office/powerpoint/2010/main" val="2301009362"/>
               </p:ext>
             </p:extLst>
           </p:nvPr>
         </p:nvGraphicFramePr>
         <p:xfrm>
-          <a:off x="3686175" y="1755140"/>
+          <a:off x="813666" y="477520"/>
           <a:ext cx="4467225" cy="2951480"/>
         </p:xfrm>
         <a:graphic>
@@ -3535,7 +3454,24 @@
                       <a:endParaRPr lang="zh-CN" altLang="en-US" dirty="0"/>
                     </a:p>
                   </a:txBody>
-                  <a:tcPr/>
+                  <a:tcPr>
+                    <a:lnR w="12700" cap="flat" cmpd="sng" algn="ctr">
+                      <a:noFill/>
+                      <a:prstDash val="solid"/>
+                      <a:round/>
+                      <a:headEnd type="none" w="med" len="med"/>
+                      <a:tailEnd type="none" w="med" len="med"/>
+                    </a:lnR>
+                    <a:lnB w="12700" cap="flat" cmpd="sng" algn="ctr">
+                      <a:solidFill>
+                        <a:schemeClr val="tx1"/>
+                      </a:solidFill>
+                      <a:prstDash val="solid"/>
+                      <a:round/>
+                      <a:headEnd type="none" w="med" len="med"/>
+                      <a:tailEnd type="none" w="med" len="med"/>
+                    </a:lnB>
+                  </a:tcPr>
                 </a:tc>
                 <a:tc>
                   <a:txBody>
@@ -3549,7 +3485,24 @@
                       <a:endParaRPr lang="zh-CN" altLang="en-US" dirty="0"/>
                     </a:p>
                   </a:txBody>
-                  <a:tcPr/>
+                  <a:tcPr>
+                    <a:lnL w="12700" cap="flat" cmpd="sng" algn="ctr">
+                      <a:noFill/>
+                      <a:prstDash val="solid"/>
+                      <a:round/>
+                      <a:headEnd type="none" w="med" len="med"/>
+                      <a:tailEnd type="none" w="med" len="med"/>
+                    </a:lnL>
+                    <a:lnB w="12700" cap="flat" cmpd="sng" algn="ctr">
+                      <a:solidFill>
+                        <a:schemeClr val="tx1"/>
+                      </a:solidFill>
+                      <a:prstDash val="solid"/>
+                      <a:round/>
+                      <a:headEnd type="none" w="med" len="med"/>
+                      <a:tailEnd type="none" w="med" len="med"/>
+                    </a:lnB>
+                  </a:tcPr>
                 </a:tc>
                 <a:extLst>
                   <a:ext uri="{0D108BD9-81ED-4DB2-BD59-A6C34878D82A}">
@@ -3571,7 +3524,33 @@
                       <a:endParaRPr lang="zh-CN" altLang="en-US" dirty="0"/>
                     </a:p>
                   </a:txBody>
-                  <a:tcPr/>
+                  <a:tcPr>
+                    <a:lnR w="12700" cap="flat" cmpd="sng" algn="ctr">
+                      <a:noFill/>
+                      <a:prstDash val="solid"/>
+                      <a:round/>
+                      <a:headEnd type="none" w="med" len="med"/>
+                      <a:tailEnd type="none" w="med" len="med"/>
+                    </a:lnR>
+                    <a:lnT w="12700" cap="flat" cmpd="sng" algn="ctr">
+                      <a:solidFill>
+                        <a:schemeClr val="tx1"/>
+                      </a:solidFill>
+                      <a:prstDash val="solid"/>
+                      <a:round/>
+                      <a:headEnd type="none" w="med" len="med"/>
+                      <a:tailEnd type="none" w="med" len="med"/>
+                    </a:lnT>
+                    <a:lnB w="12700" cap="flat" cmpd="sng" algn="ctr">
+                      <a:solidFill>
+                        <a:schemeClr val="tx1"/>
+                      </a:solidFill>
+                      <a:prstDash val="solid"/>
+                      <a:round/>
+                      <a:headEnd type="none" w="med" len="med"/>
+                      <a:tailEnd type="none" w="med" len="med"/>
+                    </a:lnB>
+                  </a:tcPr>
                 </a:tc>
                 <a:tc>
                   <a:txBody>
@@ -3602,7 +3581,33 @@
                       <a:endParaRPr lang="zh-CN" altLang="en-US" dirty="0"/>
                     </a:p>
                   </a:txBody>
-                  <a:tcPr/>
+                  <a:tcPr>
+                    <a:lnL w="12700" cap="flat" cmpd="sng" algn="ctr">
+                      <a:noFill/>
+                      <a:prstDash val="solid"/>
+                      <a:round/>
+                      <a:headEnd type="none" w="med" len="med"/>
+                      <a:tailEnd type="none" w="med" len="med"/>
+                    </a:lnL>
+                    <a:lnT w="12700" cap="flat" cmpd="sng" algn="ctr">
+                      <a:solidFill>
+                        <a:schemeClr val="tx1"/>
+                      </a:solidFill>
+                      <a:prstDash val="solid"/>
+                      <a:round/>
+                      <a:headEnd type="none" w="med" len="med"/>
+                      <a:tailEnd type="none" w="med" len="med"/>
+                    </a:lnT>
+                    <a:lnB w="12700" cap="flat" cmpd="sng" algn="ctr">
+                      <a:solidFill>
+                        <a:schemeClr val="tx1"/>
+                      </a:solidFill>
+                      <a:prstDash val="solid"/>
+                      <a:round/>
+                      <a:headEnd type="none" w="med" len="med"/>
+                      <a:tailEnd type="none" w="med" len="med"/>
+                    </a:lnB>
+                  </a:tcPr>
                 </a:tc>
                 <a:extLst>
                   <a:ext uri="{0D108BD9-81ED-4DB2-BD59-A6C34878D82A}">
@@ -3624,7 +3629,33 @@
                       <a:endParaRPr lang="zh-CN" altLang="en-US" dirty="0"/>
                     </a:p>
                   </a:txBody>
-                  <a:tcPr/>
+                  <a:tcPr>
+                    <a:lnR w="12700" cap="flat" cmpd="sng" algn="ctr">
+                      <a:noFill/>
+                      <a:prstDash val="solid"/>
+                      <a:round/>
+                      <a:headEnd type="none" w="med" len="med"/>
+                      <a:tailEnd type="none" w="med" len="med"/>
+                    </a:lnR>
+                    <a:lnT w="12700" cap="flat" cmpd="sng" algn="ctr">
+                      <a:solidFill>
+                        <a:schemeClr val="tx1"/>
+                      </a:solidFill>
+                      <a:prstDash val="solid"/>
+                      <a:round/>
+                      <a:headEnd type="none" w="med" len="med"/>
+                      <a:tailEnd type="none" w="med" len="med"/>
+                    </a:lnT>
+                    <a:lnB w="12700" cap="flat" cmpd="sng" algn="ctr">
+                      <a:solidFill>
+                        <a:schemeClr val="tx1"/>
+                      </a:solidFill>
+                      <a:prstDash val="solid"/>
+                      <a:round/>
+                      <a:headEnd type="none" w="med" len="med"/>
+                      <a:tailEnd type="none" w="med" len="med"/>
+                    </a:lnB>
+                  </a:tcPr>
                 </a:tc>
                 <a:tc>
                   <a:txBody>
@@ -3655,7 +3686,33 @@
                       <a:endParaRPr lang="zh-CN" altLang="en-US" dirty="0"/>
                     </a:p>
                   </a:txBody>
-                  <a:tcPr/>
+                  <a:tcPr>
+                    <a:lnL w="12700" cap="flat" cmpd="sng" algn="ctr">
+                      <a:noFill/>
+                      <a:prstDash val="solid"/>
+                      <a:round/>
+                      <a:headEnd type="none" w="med" len="med"/>
+                      <a:tailEnd type="none" w="med" len="med"/>
+                    </a:lnL>
+                    <a:lnT w="12700" cap="flat" cmpd="sng" algn="ctr">
+                      <a:solidFill>
+                        <a:schemeClr val="tx1"/>
+                      </a:solidFill>
+                      <a:prstDash val="solid"/>
+                      <a:round/>
+                      <a:headEnd type="none" w="med" len="med"/>
+                      <a:tailEnd type="none" w="med" len="med"/>
+                    </a:lnT>
+                    <a:lnB w="12700" cap="flat" cmpd="sng" algn="ctr">
+                      <a:solidFill>
+                        <a:schemeClr val="tx1"/>
+                      </a:solidFill>
+                      <a:prstDash val="solid"/>
+                      <a:round/>
+                      <a:headEnd type="none" w="med" len="med"/>
+                      <a:tailEnd type="none" w="med" len="med"/>
+                    </a:lnB>
+                  </a:tcPr>
                 </a:tc>
                 <a:extLst>
                   <a:ext uri="{0D108BD9-81ED-4DB2-BD59-A6C34878D82A}">
@@ -3677,7 +3734,33 @@
                       <a:endParaRPr lang="zh-CN" altLang="en-US" dirty="0"/>
                     </a:p>
                   </a:txBody>
-                  <a:tcPr/>
+                  <a:tcPr>
+                    <a:lnR w="12700" cap="flat" cmpd="sng" algn="ctr">
+                      <a:noFill/>
+                      <a:prstDash val="solid"/>
+                      <a:round/>
+                      <a:headEnd type="none" w="med" len="med"/>
+                      <a:tailEnd type="none" w="med" len="med"/>
+                    </a:lnR>
+                    <a:lnT w="12700" cap="flat" cmpd="sng" algn="ctr">
+                      <a:solidFill>
+                        <a:schemeClr val="tx1"/>
+                      </a:solidFill>
+                      <a:prstDash val="solid"/>
+                      <a:round/>
+                      <a:headEnd type="none" w="med" len="med"/>
+                      <a:tailEnd type="none" w="med" len="med"/>
+                    </a:lnT>
+                    <a:lnB w="12700" cap="flat" cmpd="sng" algn="ctr">
+                      <a:solidFill>
+                        <a:schemeClr val="tx1"/>
+                      </a:solidFill>
+                      <a:prstDash val="solid"/>
+                      <a:round/>
+                      <a:headEnd type="none" w="med" len="med"/>
+                      <a:tailEnd type="none" w="med" len="med"/>
+                    </a:lnB>
+                  </a:tcPr>
                 </a:tc>
                 <a:tc>
                   <a:txBody>
@@ -3708,7 +3791,33 @@
                       <a:endParaRPr lang="zh-CN" altLang="en-US" dirty="0"/>
                     </a:p>
                   </a:txBody>
-                  <a:tcPr/>
+                  <a:tcPr>
+                    <a:lnL w="12700" cap="flat" cmpd="sng" algn="ctr">
+                      <a:noFill/>
+                      <a:prstDash val="solid"/>
+                      <a:round/>
+                      <a:headEnd type="none" w="med" len="med"/>
+                      <a:tailEnd type="none" w="med" len="med"/>
+                    </a:lnL>
+                    <a:lnT w="12700" cap="flat" cmpd="sng" algn="ctr">
+                      <a:solidFill>
+                        <a:schemeClr val="tx1"/>
+                      </a:solidFill>
+                      <a:prstDash val="solid"/>
+                      <a:round/>
+                      <a:headEnd type="none" w="med" len="med"/>
+                      <a:tailEnd type="none" w="med" len="med"/>
+                    </a:lnT>
+                    <a:lnB w="12700" cap="flat" cmpd="sng" algn="ctr">
+                      <a:solidFill>
+                        <a:schemeClr val="tx1"/>
+                      </a:solidFill>
+                      <a:prstDash val="solid"/>
+                      <a:round/>
+                      <a:headEnd type="none" w="med" len="med"/>
+                      <a:tailEnd type="none" w="med" len="med"/>
+                    </a:lnB>
+                  </a:tcPr>
                 </a:tc>
                 <a:extLst>
                   <a:ext uri="{0D108BD9-81ED-4DB2-BD59-A6C34878D82A}">
@@ -3730,7 +3839,33 @@
                       <a:endParaRPr lang="zh-CN" altLang="en-US" dirty="0"/>
                     </a:p>
                   </a:txBody>
-                  <a:tcPr/>
+                  <a:tcPr>
+                    <a:lnR w="12700" cap="flat" cmpd="sng" algn="ctr">
+                      <a:noFill/>
+                      <a:prstDash val="solid"/>
+                      <a:round/>
+                      <a:headEnd type="none" w="med" len="med"/>
+                      <a:tailEnd type="none" w="med" len="med"/>
+                    </a:lnR>
+                    <a:lnT w="12700" cap="flat" cmpd="sng" algn="ctr">
+                      <a:solidFill>
+                        <a:schemeClr val="tx1"/>
+                      </a:solidFill>
+                      <a:prstDash val="solid"/>
+                      <a:round/>
+                      <a:headEnd type="none" w="med" len="med"/>
+                      <a:tailEnd type="none" w="med" len="med"/>
+                    </a:lnT>
+                    <a:lnB w="12700" cap="flat" cmpd="sng" algn="ctr">
+                      <a:solidFill>
+                        <a:schemeClr val="tx1"/>
+                      </a:solidFill>
+                      <a:prstDash val="solid"/>
+                      <a:round/>
+                      <a:headEnd type="none" w="med" len="med"/>
+                      <a:tailEnd type="none" w="med" len="med"/>
+                    </a:lnB>
+                  </a:tcPr>
                 </a:tc>
                 <a:tc>
                   <a:txBody>
@@ -3744,7 +3879,33 @@
                       <a:endParaRPr lang="zh-CN" altLang="en-US" dirty="0"/>
                     </a:p>
                   </a:txBody>
-                  <a:tcPr/>
+                  <a:tcPr>
+                    <a:lnL w="12700" cap="flat" cmpd="sng" algn="ctr">
+                      <a:noFill/>
+                      <a:prstDash val="solid"/>
+                      <a:round/>
+                      <a:headEnd type="none" w="med" len="med"/>
+                      <a:tailEnd type="none" w="med" len="med"/>
+                    </a:lnL>
+                    <a:lnT w="12700" cap="flat" cmpd="sng" algn="ctr">
+                      <a:solidFill>
+                        <a:schemeClr val="tx1"/>
+                      </a:solidFill>
+                      <a:prstDash val="solid"/>
+                      <a:round/>
+                      <a:headEnd type="none" w="med" len="med"/>
+                      <a:tailEnd type="none" w="med" len="med"/>
+                    </a:lnT>
+                    <a:lnB w="12700" cap="flat" cmpd="sng" algn="ctr">
+                      <a:solidFill>
+                        <a:schemeClr val="tx1"/>
+                      </a:solidFill>
+                      <a:prstDash val="solid"/>
+                      <a:round/>
+                      <a:headEnd type="none" w="med" len="med"/>
+                      <a:tailEnd type="none" w="med" len="med"/>
+                    </a:lnB>
+                  </a:tcPr>
                 </a:tc>
                 <a:extLst>
                   <a:ext uri="{0D108BD9-81ED-4DB2-BD59-A6C34878D82A}">
@@ -3766,7 +3927,33 @@
                       <a:endParaRPr lang="zh-CN" altLang="en-US" dirty="0"/>
                     </a:p>
                   </a:txBody>
-                  <a:tcPr/>
+                  <a:tcPr>
+                    <a:lnR w="12700" cap="flat" cmpd="sng" algn="ctr">
+                      <a:noFill/>
+                      <a:prstDash val="solid"/>
+                      <a:round/>
+                      <a:headEnd type="none" w="med" len="med"/>
+                      <a:tailEnd type="none" w="med" len="med"/>
+                    </a:lnR>
+                    <a:lnT w="12700" cap="flat" cmpd="sng" algn="ctr">
+                      <a:solidFill>
+                        <a:schemeClr val="tx1"/>
+                      </a:solidFill>
+                      <a:prstDash val="solid"/>
+                      <a:round/>
+                      <a:headEnd type="none" w="med" len="med"/>
+                      <a:tailEnd type="none" w="med" len="med"/>
+                    </a:lnT>
+                    <a:lnB w="12700" cap="flat" cmpd="sng" algn="ctr">
+                      <a:solidFill>
+                        <a:schemeClr val="tx1"/>
+                      </a:solidFill>
+                      <a:prstDash val="solid"/>
+                      <a:round/>
+                      <a:headEnd type="none" w="med" len="med"/>
+                      <a:tailEnd type="none" w="med" len="med"/>
+                    </a:lnB>
+                  </a:tcPr>
                 </a:tc>
                 <a:tc>
                   <a:txBody>
@@ -3797,7 +3984,33 @@
                       <a:endParaRPr lang="zh-CN" altLang="en-US" dirty="0"/>
                     </a:p>
                   </a:txBody>
-                  <a:tcPr/>
+                  <a:tcPr>
+                    <a:lnL w="12700" cap="flat" cmpd="sng" algn="ctr">
+                      <a:noFill/>
+                      <a:prstDash val="solid"/>
+                      <a:round/>
+                      <a:headEnd type="none" w="med" len="med"/>
+                      <a:tailEnd type="none" w="med" len="med"/>
+                    </a:lnL>
+                    <a:lnT w="12700" cap="flat" cmpd="sng" algn="ctr">
+                      <a:solidFill>
+                        <a:schemeClr val="tx1"/>
+                      </a:solidFill>
+                      <a:prstDash val="solid"/>
+                      <a:round/>
+                      <a:headEnd type="none" w="med" len="med"/>
+                      <a:tailEnd type="none" w="med" len="med"/>
+                    </a:lnT>
+                    <a:lnB w="12700" cap="flat" cmpd="sng" algn="ctr">
+                      <a:solidFill>
+                        <a:schemeClr val="tx1"/>
+                      </a:solidFill>
+                      <a:prstDash val="solid"/>
+                      <a:round/>
+                      <a:headEnd type="none" w="med" len="med"/>
+                      <a:tailEnd type="none" w="med" len="med"/>
+                    </a:lnB>
+                  </a:tcPr>
                 </a:tc>
                 <a:extLst>
                   <a:ext uri="{0D108BD9-81ED-4DB2-BD59-A6C34878D82A}">
@@ -3819,7 +4032,33 @@
                       <a:endParaRPr lang="zh-CN" altLang="en-US" dirty="0"/>
                     </a:p>
                   </a:txBody>
-                  <a:tcPr/>
+                  <a:tcPr>
+                    <a:lnR w="12700" cap="flat" cmpd="sng" algn="ctr">
+                      <a:noFill/>
+                      <a:prstDash val="solid"/>
+                      <a:round/>
+                      <a:headEnd type="none" w="med" len="med"/>
+                      <a:tailEnd type="none" w="med" len="med"/>
+                    </a:lnR>
+                    <a:lnT w="12700" cap="flat" cmpd="sng" algn="ctr">
+                      <a:solidFill>
+                        <a:schemeClr val="tx1"/>
+                      </a:solidFill>
+                      <a:prstDash val="solid"/>
+                      <a:round/>
+                      <a:headEnd type="none" w="med" len="med"/>
+                      <a:tailEnd type="none" w="med" len="med"/>
+                    </a:lnT>
+                    <a:lnB w="12700" cap="flat" cmpd="sng" algn="ctr">
+                      <a:solidFill>
+                        <a:schemeClr val="tx1"/>
+                      </a:solidFill>
+                      <a:prstDash val="solid"/>
+                      <a:round/>
+                      <a:headEnd type="none" w="med" len="med"/>
+                      <a:tailEnd type="none" w="med" len="med"/>
+                    </a:lnB>
+                  </a:tcPr>
                 </a:tc>
                 <a:tc>
                   <a:txBody>
@@ -3833,7 +4072,33 @@
                       <a:endParaRPr lang="zh-CN" altLang="en-US" dirty="0"/>
                     </a:p>
                   </a:txBody>
-                  <a:tcPr/>
+                  <a:tcPr>
+                    <a:lnL w="12700" cap="flat" cmpd="sng" algn="ctr">
+                      <a:noFill/>
+                      <a:prstDash val="solid"/>
+                      <a:round/>
+                      <a:headEnd type="none" w="med" len="med"/>
+                      <a:tailEnd type="none" w="med" len="med"/>
+                    </a:lnL>
+                    <a:lnT w="12700" cap="flat" cmpd="sng" algn="ctr">
+                      <a:solidFill>
+                        <a:schemeClr val="tx1"/>
+                      </a:solidFill>
+                      <a:prstDash val="solid"/>
+                      <a:round/>
+                      <a:headEnd type="none" w="med" len="med"/>
+                      <a:tailEnd type="none" w="med" len="med"/>
+                    </a:lnT>
+                    <a:lnB w="12700" cap="flat" cmpd="sng" algn="ctr">
+                      <a:solidFill>
+                        <a:schemeClr val="tx1"/>
+                      </a:solidFill>
+                      <a:prstDash val="solid"/>
+                      <a:round/>
+                      <a:headEnd type="none" w="med" len="med"/>
+                      <a:tailEnd type="none" w="med" len="med"/>
+                    </a:lnB>
+                  </a:tcPr>
                 </a:tc>
                 <a:extLst>
                   <a:ext uri="{0D108BD9-81ED-4DB2-BD59-A6C34878D82A}">
@@ -3855,7 +4120,24 @@
                       <a:endParaRPr lang="zh-CN" altLang="en-US" dirty="0"/>
                     </a:p>
                   </a:txBody>
-                  <a:tcPr/>
+                  <a:tcPr>
+                    <a:lnR w="12700" cap="flat" cmpd="sng" algn="ctr">
+                      <a:noFill/>
+                      <a:prstDash val="solid"/>
+                      <a:round/>
+                      <a:headEnd type="none" w="med" len="med"/>
+                      <a:tailEnd type="none" w="med" len="med"/>
+                    </a:lnR>
+                    <a:lnT w="12700" cap="flat" cmpd="sng" algn="ctr">
+                      <a:solidFill>
+                        <a:schemeClr val="tx1"/>
+                      </a:solidFill>
+                      <a:prstDash val="solid"/>
+                      <a:round/>
+                      <a:headEnd type="none" w="med" len="med"/>
+                      <a:tailEnd type="none" w="med" len="med"/>
+                    </a:lnT>
+                  </a:tcPr>
                 </a:tc>
                 <a:tc>
                   <a:txBody>
@@ -3869,7 +4151,24 @@
                       <a:endParaRPr lang="zh-CN" altLang="en-US" dirty="0"/>
                     </a:p>
                   </a:txBody>
-                  <a:tcPr/>
+                  <a:tcPr>
+                    <a:lnL w="12700" cap="flat" cmpd="sng" algn="ctr">
+                      <a:noFill/>
+                      <a:prstDash val="solid"/>
+                      <a:round/>
+                      <a:headEnd type="none" w="med" len="med"/>
+                      <a:tailEnd type="none" w="med" len="med"/>
+                    </a:lnL>
+                    <a:lnT w="12700" cap="flat" cmpd="sng" algn="ctr">
+                      <a:solidFill>
+                        <a:schemeClr val="tx1"/>
+                      </a:solidFill>
+                      <a:prstDash val="solid"/>
+                      <a:round/>
+                      <a:headEnd type="none" w="med" len="med"/>
+                      <a:tailEnd type="none" w="med" len="med"/>
+                    </a:lnT>
+                  </a:tcPr>
                 </a:tc>
                 <a:extLst>
                   <a:ext uri="{0D108BD9-81ED-4DB2-BD59-A6C34878D82A}">
@@ -3895,7 +4194,7 @@
         </p:nvSpPr>
         <p:spPr>
           <a:xfrm>
-            <a:off x="3458020" y="1898649"/>
+            <a:off x="585511" y="621029"/>
             <a:ext cx="339280" cy="378459"/>
           </a:xfrm>
           <a:custGeom>
@@ -4035,7 +4334,7 @@
         </p:nvSpPr>
         <p:spPr>
           <a:xfrm>
-            <a:off x="3421508" y="2349499"/>
+            <a:off x="548999" y="1071879"/>
             <a:ext cx="339280" cy="378459"/>
           </a:xfrm>
           <a:custGeom>
@@ -4175,8 +4474,8 @@
         </p:nvSpPr>
         <p:spPr>
           <a:xfrm flipH="1">
-            <a:off x="6599238" y="2349499"/>
-            <a:ext cx="563562" cy="1079501"/>
+            <a:off x="3001098" y="1053928"/>
+            <a:ext cx="1113709" cy="1124412"/>
           </a:xfrm>
           <a:custGeom>
             <a:avLst/>
@@ -4229,6 +4528,38 @@
               <a:gd name="connsiteY2" fmla="*/ 261978 h 520374"/>
               <a:gd name="connsiteX3" fmla="*/ 494344 w 511560"/>
               <a:gd name="connsiteY3" fmla="*/ 520374 h 520374"/>
+              <a:gd name="connsiteX0" fmla="*/ 512968 w 512968"/>
+              <a:gd name="connsiteY0" fmla="*/ 0 h 511963"/>
+              <a:gd name="connsiteX1" fmla="*/ 512968 w 512968"/>
+              <a:gd name="connsiteY1" fmla="*/ 0 h 511963"/>
+              <a:gd name="connsiteX2" fmla="*/ 1440 w 512968"/>
+              <a:gd name="connsiteY2" fmla="*/ 261978 h 511963"/>
+              <a:gd name="connsiteX3" fmla="*/ 289841 w 512968"/>
+              <a:gd name="connsiteY3" fmla="*/ 511963 h 511963"/>
+              <a:gd name="connsiteX0" fmla="*/ 505099 w 505099"/>
+              <a:gd name="connsiteY0" fmla="*/ 0 h 511963"/>
+              <a:gd name="connsiteX1" fmla="*/ 505099 w 505099"/>
+              <a:gd name="connsiteY1" fmla="*/ 0 h 511963"/>
+              <a:gd name="connsiteX2" fmla="*/ 2150 w 505099"/>
+              <a:gd name="connsiteY2" fmla="*/ 219924 h 511963"/>
+              <a:gd name="connsiteX3" fmla="*/ 281972 w 505099"/>
+              <a:gd name="connsiteY3" fmla="*/ 511963 h 511963"/>
+              <a:gd name="connsiteX0" fmla="*/ 517260 w 517260"/>
+              <a:gd name="connsiteY0" fmla="*/ 0 h 511963"/>
+              <a:gd name="connsiteX1" fmla="*/ 517260 w 517260"/>
+              <a:gd name="connsiteY1" fmla="*/ 0 h 511963"/>
+              <a:gd name="connsiteX2" fmla="*/ 14311 w 517260"/>
+              <a:gd name="connsiteY2" fmla="*/ 219924 h 511963"/>
+              <a:gd name="connsiteX3" fmla="*/ 294133 w 517260"/>
+              <a:gd name="connsiteY3" fmla="*/ 511963 h 511963"/>
+              <a:gd name="connsiteX0" fmla="*/ 517260 w 517260"/>
+              <a:gd name="connsiteY0" fmla="*/ 0 h 511963"/>
+              <a:gd name="connsiteX1" fmla="*/ 517260 w 517260"/>
+              <a:gd name="connsiteY1" fmla="*/ 0 h 511963"/>
+              <a:gd name="connsiteX2" fmla="*/ 14311 w 517260"/>
+              <a:gd name="connsiteY2" fmla="*/ 219924 h 511963"/>
+              <a:gd name="connsiteX3" fmla="*/ 294133 w 517260"/>
+              <a:gd name="connsiteY3" fmla="*/ 511963 h 511963"/>
             </a:gdLst>
             <a:ahLst/>
             <a:cxnLst>
@@ -4247,22 +4578,22 @@
             </a:cxnLst>
             <a:rect l="l" t="t" r="r" b="b"/>
             <a:pathLst>
-              <a:path w="511560" h="520374">
+              <a:path w="517260" h="511963">
                 <a:moveTo>
-                  <a:pt x="511560" y="0"/>
+                  <a:pt x="517260" y="0"/>
                 </a:moveTo>
                 <a:lnTo>
-                  <a:pt x="511560" y="0"/>
+                  <a:pt x="517260" y="0"/>
                 </a:lnTo>
                 <a:cubicBezTo>
-                  <a:pt x="426305" y="43663"/>
-                  <a:pt x="2901" y="175249"/>
-                  <a:pt x="32" y="261978"/>
+                  <a:pt x="432005" y="43663"/>
+                  <a:pt x="38629" y="145811"/>
+                  <a:pt x="14311" y="219924"/>
                 </a:cubicBezTo>
                 <a:cubicBezTo>
-                  <a:pt x="-2837" y="348707"/>
-                  <a:pt x="180372" y="495136"/>
-                  <a:pt x="494344" y="520374"/>
+                  <a:pt x="-18586" y="306653"/>
+                  <a:pt x="-19839" y="486725"/>
+                  <a:pt x="294133" y="511963"/>
                 </a:cubicBezTo>
               </a:path>
             </a:pathLst>
@@ -4316,7 +4647,7 @@
         </p:nvSpPr>
         <p:spPr>
           <a:xfrm>
-            <a:off x="3402458" y="2800349"/>
+            <a:off x="529949" y="1522729"/>
             <a:ext cx="339280" cy="1329694"/>
           </a:xfrm>
           <a:custGeom>
@@ -4455,7 +4786,7 @@
 </p:sld>
 </file>
 
-<file path=ppt/slides/slide3.xml><?xml version="1.0" encoding="utf-8"?>
+<file path=ppt/slides/slide2.xml><?xml version="1.0" encoding="utf-8"?>
 <p:sld xmlns:a="http://schemas.openxmlformats.org/drawingml/2006/main" xmlns:r="http://schemas.openxmlformats.org/officeDocument/2006/relationships" xmlns:p="http://schemas.openxmlformats.org/presentationml/2006/main">
   <p:cSld>
     <p:spTree>
@@ -5885,7 +6216,7 @@
 </p:sld>
 </file>
 
-<file path=ppt/slides/slide4.xml><?xml version="1.0" encoding="utf-8"?>
+<file path=ppt/slides/slide3.xml><?xml version="1.0" encoding="utf-8"?>
 <p:sld xmlns:a="http://schemas.openxmlformats.org/drawingml/2006/main" xmlns:r="http://schemas.openxmlformats.org/officeDocument/2006/relationships" xmlns:p="http://schemas.openxmlformats.org/presentationml/2006/main">
   <p:cSld>
     <p:spTree>
@@ -5917,7 +6248,7 @@
           <p:nvPr>
             <p:extLst>
               <p:ext uri="{D42A27DB-BD31-4B8C-83A1-F6EECF244321}">
-                <p14:modId xmlns:p14="http://schemas.microsoft.com/office/powerpoint/2010/main" val="2287599925"/>
+                <p14:modId xmlns:p14="http://schemas.microsoft.com/office/powerpoint/2010/main" val="918594139"/>
               </p:ext>
             </p:extLst>
           </p:nvPr>
@@ -5962,7 +6293,24 @@
                       <a:endParaRPr lang="zh-CN" altLang="en-US" dirty="0"/>
                     </a:p>
                   </a:txBody>
-                  <a:tcPr/>
+                  <a:tcPr>
+                    <a:lnR w="12700" cap="flat" cmpd="sng" algn="ctr">
+                      <a:noFill/>
+                      <a:prstDash val="solid"/>
+                      <a:round/>
+                      <a:headEnd type="none" w="med" len="med"/>
+                      <a:tailEnd type="none" w="med" len="med"/>
+                    </a:lnR>
+                    <a:lnB w="12700" cap="flat" cmpd="sng" algn="ctr">
+                      <a:solidFill>
+                        <a:schemeClr val="tx1"/>
+                      </a:solidFill>
+                      <a:prstDash val="solid"/>
+                      <a:round/>
+                      <a:headEnd type="none" w="med" len="med"/>
+                      <a:tailEnd type="none" w="med" len="med"/>
+                    </a:lnB>
+                  </a:tcPr>
                 </a:tc>
                 <a:tc>
                   <a:txBody>
@@ -5976,7 +6324,24 @@
                       <a:endParaRPr lang="zh-CN" altLang="en-US" dirty="0"/>
                     </a:p>
                   </a:txBody>
-                  <a:tcPr/>
+                  <a:tcPr>
+                    <a:lnL w="12700" cap="flat" cmpd="sng" algn="ctr">
+                      <a:noFill/>
+                      <a:prstDash val="solid"/>
+                      <a:round/>
+                      <a:headEnd type="none" w="med" len="med"/>
+                      <a:tailEnd type="none" w="med" len="med"/>
+                    </a:lnL>
+                    <a:lnB w="12700" cap="flat" cmpd="sng" algn="ctr">
+                      <a:solidFill>
+                        <a:schemeClr val="tx1"/>
+                      </a:solidFill>
+                      <a:prstDash val="solid"/>
+                      <a:round/>
+                      <a:headEnd type="none" w="med" len="med"/>
+                      <a:tailEnd type="none" w="med" len="med"/>
+                    </a:lnB>
+                  </a:tcPr>
                 </a:tc>
                 <a:extLst>
                   <a:ext uri="{0D108BD9-81ED-4DB2-BD59-A6C34878D82A}">
@@ -5998,7 +6363,33 @@
                       <a:endParaRPr lang="zh-CN" altLang="en-US" dirty="0"/>
                     </a:p>
                   </a:txBody>
-                  <a:tcPr/>
+                  <a:tcPr>
+                    <a:lnR w="12700" cap="flat" cmpd="sng" algn="ctr">
+                      <a:noFill/>
+                      <a:prstDash val="solid"/>
+                      <a:round/>
+                      <a:headEnd type="none" w="med" len="med"/>
+                      <a:tailEnd type="none" w="med" len="med"/>
+                    </a:lnR>
+                    <a:lnT w="12700" cap="flat" cmpd="sng" algn="ctr">
+                      <a:solidFill>
+                        <a:schemeClr val="tx1"/>
+                      </a:solidFill>
+                      <a:prstDash val="solid"/>
+                      <a:round/>
+                      <a:headEnd type="none" w="med" len="med"/>
+                      <a:tailEnd type="none" w="med" len="med"/>
+                    </a:lnT>
+                    <a:lnB w="12700" cap="flat" cmpd="sng" algn="ctr">
+                      <a:solidFill>
+                        <a:schemeClr val="tx1"/>
+                      </a:solidFill>
+                      <a:prstDash val="solid"/>
+                      <a:round/>
+                      <a:headEnd type="none" w="med" len="med"/>
+                      <a:tailEnd type="none" w="med" len="med"/>
+                    </a:lnB>
+                  </a:tcPr>
                 </a:tc>
                 <a:tc>
                   <a:txBody>
@@ -6029,7 +6420,33 @@
                       <a:endParaRPr lang="zh-CN" altLang="en-US" dirty="0"/>
                     </a:p>
                   </a:txBody>
-                  <a:tcPr/>
+                  <a:tcPr>
+                    <a:lnL w="12700" cap="flat" cmpd="sng" algn="ctr">
+                      <a:noFill/>
+                      <a:prstDash val="solid"/>
+                      <a:round/>
+                      <a:headEnd type="none" w="med" len="med"/>
+                      <a:tailEnd type="none" w="med" len="med"/>
+                    </a:lnL>
+                    <a:lnT w="12700" cap="flat" cmpd="sng" algn="ctr">
+                      <a:solidFill>
+                        <a:schemeClr val="tx1"/>
+                      </a:solidFill>
+                      <a:prstDash val="solid"/>
+                      <a:round/>
+                      <a:headEnd type="none" w="med" len="med"/>
+                      <a:tailEnd type="none" w="med" len="med"/>
+                    </a:lnT>
+                    <a:lnB w="12700" cap="flat" cmpd="sng" algn="ctr">
+                      <a:solidFill>
+                        <a:schemeClr val="tx1"/>
+                      </a:solidFill>
+                      <a:prstDash val="solid"/>
+                      <a:round/>
+                      <a:headEnd type="none" w="med" len="med"/>
+                      <a:tailEnd type="none" w="med" len="med"/>
+                    </a:lnB>
+                  </a:tcPr>
                 </a:tc>
                 <a:extLst>
                   <a:ext uri="{0D108BD9-81ED-4DB2-BD59-A6C34878D82A}">
@@ -6051,7 +6468,33 @@
                       <a:endParaRPr lang="zh-CN" altLang="en-US" dirty="0"/>
                     </a:p>
                   </a:txBody>
-                  <a:tcPr/>
+                  <a:tcPr>
+                    <a:lnR w="12700" cap="flat" cmpd="sng" algn="ctr">
+                      <a:noFill/>
+                      <a:prstDash val="solid"/>
+                      <a:round/>
+                      <a:headEnd type="none" w="med" len="med"/>
+                      <a:tailEnd type="none" w="med" len="med"/>
+                    </a:lnR>
+                    <a:lnT w="12700" cap="flat" cmpd="sng" algn="ctr">
+                      <a:solidFill>
+                        <a:schemeClr val="tx1"/>
+                      </a:solidFill>
+                      <a:prstDash val="solid"/>
+                      <a:round/>
+                      <a:headEnd type="none" w="med" len="med"/>
+                      <a:tailEnd type="none" w="med" len="med"/>
+                    </a:lnT>
+                    <a:lnB w="12700" cap="flat" cmpd="sng" algn="ctr">
+                      <a:solidFill>
+                        <a:schemeClr val="tx1"/>
+                      </a:solidFill>
+                      <a:prstDash val="solid"/>
+                      <a:round/>
+                      <a:headEnd type="none" w="med" len="med"/>
+                      <a:tailEnd type="none" w="med" len="med"/>
+                    </a:lnB>
+                  </a:tcPr>
                 </a:tc>
                 <a:tc>
                   <a:txBody>
@@ -6090,7 +6533,33 @@
                       <a:endParaRPr lang="zh-CN" altLang="en-US" dirty="0"/>
                     </a:p>
                   </a:txBody>
-                  <a:tcPr/>
+                  <a:tcPr>
+                    <a:lnL w="12700" cap="flat" cmpd="sng" algn="ctr">
+                      <a:noFill/>
+                      <a:prstDash val="solid"/>
+                      <a:round/>
+                      <a:headEnd type="none" w="med" len="med"/>
+                      <a:tailEnd type="none" w="med" len="med"/>
+                    </a:lnL>
+                    <a:lnT w="12700" cap="flat" cmpd="sng" algn="ctr">
+                      <a:solidFill>
+                        <a:schemeClr val="tx1"/>
+                      </a:solidFill>
+                      <a:prstDash val="solid"/>
+                      <a:round/>
+                      <a:headEnd type="none" w="med" len="med"/>
+                      <a:tailEnd type="none" w="med" len="med"/>
+                    </a:lnT>
+                    <a:lnB w="12700" cap="flat" cmpd="sng" algn="ctr">
+                      <a:solidFill>
+                        <a:schemeClr val="tx1"/>
+                      </a:solidFill>
+                      <a:prstDash val="solid"/>
+                      <a:round/>
+                      <a:headEnd type="none" w="med" len="med"/>
+                      <a:tailEnd type="none" w="med" len="med"/>
+                    </a:lnB>
+                  </a:tcPr>
                 </a:tc>
                 <a:extLst>
                   <a:ext uri="{0D108BD9-81ED-4DB2-BD59-A6C34878D82A}">
@@ -6112,7 +6581,33 @@
                       <a:endParaRPr lang="zh-CN" altLang="en-US" dirty="0"/>
                     </a:p>
                   </a:txBody>
-                  <a:tcPr/>
+                  <a:tcPr>
+                    <a:lnR w="12700" cap="flat" cmpd="sng" algn="ctr">
+                      <a:noFill/>
+                      <a:prstDash val="solid"/>
+                      <a:round/>
+                      <a:headEnd type="none" w="med" len="med"/>
+                      <a:tailEnd type="none" w="med" len="med"/>
+                    </a:lnR>
+                    <a:lnT w="12700" cap="flat" cmpd="sng" algn="ctr">
+                      <a:solidFill>
+                        <a:schemeClr val="tx1"/>
+                      </a:solidFill>
+                      <a:prstDash val="solid"/>
+                      <a:round/>
+                      <a:headEnd type="none" w="med" len="med"/>
+                      <a:tailEnd type="none" w="med" len="med"/>
+                    </a:lnT>
+                    <a:lnB w="12700" cap="flat" cmpd="sng" algn="ctr">
+                      <a:solidFill>
+                        <a:schemeClr val="tx1"/>
+                      </a:solidFill>
+                      <a:prstDash val="solid"/>
+                      <a:round/>
+                      <a:headEnd type="none" w="med" len="med"/>
+                      <a:tailEnd type="none" w="med" len="med"/>
+                    </a:lnB>
+                  </a:tcPr>
                 </a:tc>
                 <a:tc>
                   <a:txBody>
@@ -6151,7 +6646,33 @@
                       <a:endParaRPr lang="zh-CN" altLang="en-US" dirty="0"/>
                     </a:p>
                   </a:txBody>
-                  <a:tcPr/>
+                  <a:tcPr>
+                    <a:lnL w="12700" cap="flat" cmpd="sng" algn="ctr">
+                      <a:noFill/>
+                      <a:prstDash val="solid"/>
+                      <a:round/>
+                      <a:headEnd type="none" w="med" len="med"/>
+                      <a:tailEnd type="none" w="med" len="med"/>
+                    </a:lnL>
+                    <a:lnT w="12700" cap="flat" cmpd="sng" algn="ctr">
+                      <a:solidFill>
+                        <a:schemeClr val="tx1"/>
+                      </a:solidFill>
+                      <a:prstDash val="solid"/>
+                      <a:round/>
+                      <a:headEnd type="none" w="med" len="med"/>
+                      <a:tailEnd type="none" w="med" len="med"/>
+                    </a:lnT>
+                    <a:lnB w="12700" cap="flat" cmpd="sng" algn="ctr">
+                      <a:solidFill>
+                        <a:schemeClr val="tx1"/>
+                      </a:solidFill>
+                      <a:prstDash val="solid"/>
+                      <a:round/>
+                      <a:headEnd type="none" w="med" len="med"/>
+                      <a:tailEnd type="none" w="med" len="med"/>
+                    </a:lnB>
+                  </a:tcPr>
                 </a:tc>
                 <a:extLst>
                   <a:ext uri="{0D108BD9-81ED-4DB2-BD59-A6C34878D82A}">
@@ -6173,7 +6694,33 @@
                       <a:endParaRPr lang="zh-CN" altLang="en-US" dirty="0"/>
                     </a:p>
                   </a:txBody>
-                  <a:tcPr/>
+                  <a:tcPr>
+                    <a:lnR w="12700" cap="flat" cmpd="sng" algn="ctr">
+                      <a:noFill/>
+                      <a:prstDash val="solid"/>
+                      <a:round/>
+                      <a:headEnd type="none" w="med" len="med"/>
+                      <a:tailEnd type="none" w="med" len="med"/>
+                    </a:lnR>
+                    <a:lnT w="12700" cap="flat" cmpd="sng" algn="ctr">
+                      <a:solidFill>
+                        <a:schemeClr val="tx1"/>
+                      </a:solidFill>
+                      <a:prstDash val="solid"/>
+                      <a:round/>
+                      <a:headEnd type="none" w="med" len="med"/>
+                      <a:tailEnd type="none" w="med" len="med"/>
+                    </a:lnT>
+                    <a:lnB w="12700" cap="flat" cmpd="sng" algn="ctr">
+                      <a:solidFill>
+                        <a:schemeClr val="tx1"/>
+                      </a:solidFill>
+                      <a:prstDash val="solid"/>
+                      <a:round/>
+                      <a:headEnd type="none" w="med" len="med"/>
+                      <a:tailEnd type="none" w="med" len="med"/>
+                    </a:lnB>
+                  </a:tcPr>
                 </a:tc>
                 <a:tc>
                   <a:txBody>
@@ -6212,7 +6759,33 @@
                       <a:endParaRPr lang="zh-CN" altLang="en-US" dirty="0"/>
                     </a:p>
                   </a:txBody>
-                  <a:tcPr/>
+                  <a:tcPr>
+                    <a:lnL w="12700" cap="flat" cmpd="sng" algn="ctr">
+                      <a:noFill/>
+                      <a:prstDash val="solid"/>
+                      <a:round/>
+                      <a:headEnd type="none" w="med" len="med"/>
+                      <a:tailEnd type="none" w="med" len="med"/>
+                    </a:lnL>
+                    <a:lnT w="12700" cap="flat" cmpd="sng" algn="ctr">
+                      <a:solidFill>
+                        <a:schemeClr val="tx1"/>
+                      </a:solidFill>
+                      <a:prstDash val="solid"/>
+                      <a:round/>
+                      <a:headEnd type="none" w="med" len="med"/>
+                      <a:tailEnd type="none" w="med" len="med"/>
+                    </a:lnT>
+                    <a:lnB w="12700" cap="flat" cmpd="sng" algn="ctr">
+                      <a:solidFill>
+                        <a:schemeClr val="tx1"/>
+                      </a:solidFill>
+                      <a:prstDash val="solid"/>
+                      <a:round/>
+                      <a:headEnd type="none" w="med" len="med"/>
+                      <a:tailEnd type="none" w="med" len="med"/>
+                    </a:lnB>
+                  </a:tcPr>
                 </a:tc>
                 <a:extLst>
                   <a:ext uri="{0D108BD9-81ED-4DB2-BD59-A6C34878D82A}">
@@ -6234,7 +6807,24 @@
                       <a:endParaRPr lang="zh-CN" altLang="en-US" dirty="0"/>
                     </a:p>
                   </a:txBody>
-                  <a:tcPr/>
+                  <a:tcPr>
+                    <a:lnR w="12700" cap="flat" cmpd="sng" algn="ctr">
+                      <a:noFill/>
+                      <a:prstDash val="solid"/>
+                      <a:round/>
+                      <a:headEnd type="none" w="med" len="med"/>
+                      <a:tailEnd type="none" w="med" len="med"/>
+                    </a:lnR>
+                    <a:lnT w="12700" cap="flat" cmpd="sng" algn="ctr">
+                      <a:solidFill>
+                        <a:schemeClr val="tx1"/>
+                      </a:solidFill>
+                      <a:prstDash val="solid"/>
+                      <a:round/>
+                      <a:headEnd type="none" w="med" len="med"/>
+                      <a:tailEnd type="none" w="med" len="med"/>
+                    </a:lnT>
+                  </a:tcPr>
                 </a:tc>
                 <a:tc>
                   <a:txBody>
@@ -6265,7 +6855,24 @@
                       <a:endParaRPr lang="zh-CN" altLang="en-US" dirty="0"/>
                     </a:p>
                   </a:txBody>
-                  <a:tcPr/>
+                  <a:tcPr>
+                    <a:lnL w="12700" cap="flat" cmpd="sng" algn="ctr">
+                      <a:noFill/>
+                      <a:prstDash val="solid"/>
+                      <a:round/>
+                      <a:headEnd type="none" w="med" len="med"/>
+                      <a:tailEnd type="none" w="med" len="med"/>
+                    </a:lnL>
+                    <a:lnT w="12700" cap="flat" cmpd="sng" algn="ctr">
+                      <a:solidFill>
+                        <a:schemeClr val="tx1"/>
+                      </a:solidFill>
+                      <a:prstDash val="solid"/>
+                      <a:round/>
+                      <a:headEnd type="none" w="med" len="med"/>
+                      <a:tailEnd type="none" w="med" len="med"/>
+                    </a:lnT>
+                  </a:tcPr>
                 </a:tc>
                 <a:extLst>
                   <a:ext uri="{0D108BD9-81ED-4DB2-BD59-A6C34878D82A}">
@@ -6290,7 +6897,7 @@
 </p:sld>
 </file>
 
-<file path=ppt/slides/slide5.xml><?xml version="1.0" encoding="utf-8"?>
+<file path=ppt/slides/slide4.xml><?xml version="1.0" encoding="utf-8"?>
 <p:sld xmlns:a="http://schemas.openxmlformats.org/drawingml/2006/main" xmlns:r="http://schemas.openxmlformats.org/officeDocument/2006/relationships" xmlns:p="http://schemas.openxmlformats.org/presentationml/2006/main">
   <p:cSld>
     <p:spTree>
@@ -6322,7 +6929,7 @@
           <p:nvPr>
             <p:extLst>
               <p:ext uri="{D42A27DB-BD31-4B8C-83A1-F6EECF244321}">
-                <p14:modId xmlns:p14="http://schemas.microsoft.com/office/powerpoint/2010/main" val="3915152373"/>
+                <p14:modId xmlns:p14="http://schemas.microsoft.com/office/powerpoint/2010/main" val="2593385684"/>
               </p:ext>
             </p:extLst>
           </p:nvPr>
@@ -6367,7 +6974,24 @@
                       <a:endParaRPr lang="zh-CN" altLang="en-US" dirty="0"/>
                     </a:p>
                   </a:txBody>
-                  <a:tcPr/>
+                  <a:tcPr>
+                    <a:lnR w="12700" cap="flat" cmpd="sng" algn="ctr">
+                      <a:noFill/>
+                      <a:prstDash val="solid"/>
+                      <a:round/>
+                      <a:headEnd type="none" w="med" len="med"/>
+                      <a:tailEnd type="none" w="med" len="med"/>
+                    </a:lnR>
+                    <a:lnB w="12700" cap="flat" cmpd="sng" algn="ctr">
+                      <a:solidFill>
+                        <a:schemeClr val="tx1"/>
+                      </a:solidFill>
+                      <a:prstDash val="solid"/>
+                      <a:round/>
+                      <a:headEnd type="none" w="med" len="med"/>
+                      <a:tailEnd type="none" w="med" len="med"/>
+                    </a:lnB>
+                  </a:tcPr>
                 </a:tc>
                 <a:tc>
                   <a:txBody>
@@ -6381,7 +7005,24 @@
                       <a:endParaRPr lang="zh-CN" altLang="en-US" dirty="0"/>
                     </a:p>
                   </a:txBody>
-                  <a:tcPr/>
+                  <a:tcPr>
+                    <a:lnL w="12700" cap="flat" cmpd="sng" algn="ctr">
+                      <a:noFill/>
+                      <a:prstDash val="solid"/>
+                      <a:round/>
+                      <a:headEnd type="none" w="med" len="med"/>
+                      <a:tailEnd type="none" w="med" len="med"/>
+                    </a:lnL>
+                    <a:lnB w="12700" cap="flat" cmpd="sng" algn="ctr">
+                      <a:solidFill>
+                        <a:schemeClr val="tx1"/>
+                      </a:solidFill>
+                      <a:prstDash val="solid"/>
+                      <a:round/>
+                      <a:headEnd type="none" w="med" len="med"/>
+                      <a:tailEnd type="none" w="med" len="med"/>
+                    </a:lnB>
+                  </a:tcPr>
                 </a:tc>
                 <a:extLst>
                   <a:ext uri="{0D108BD9-81ED-4DB2-BD59-A6C34878D82A}">
@@ -6403,7 +7044,33 @@
                       <a:endParaRPr lang="zh-CN" altLang="en-US" dirty="0"/>
                     </a:p>
                   </a:txBody>
-                  <a:tcPr/>
+                  <a:tcPr>
+                    <a:lnR w="12700" cap="flat" cmpd="sng" algn="ctr">
+                      <a:noFill/>
+                      <a:prstDash val="solid"/>
+                      <a:round/>
+                      <a:headEnd type="none" w="med" len="med"/>
+                      <a:tailEnd type="none" w="med" len="med"/>
+                    </a:lnR>
+                    <a:lnT w="12700" cap="flat" cmpd="sng" algn="ctr">
+                      <a:solidFill>
+                        <a:schemeClr val="tx1"/>
+                      </a:solidFill>
+                      <a:prstDash val="solid"/>
+                      <a:round/>
+                      <a:headEnd type="none" w="med" len="med"/>
+                      <a:tailEnd type="none" w="med" len="med"/>
+                    </a:lnT>
+                    <a:lnB w="12700" cap="flat" cmpd="sng" algn="ctr">
+                      <a:solidFill>
+                        <a:schemeClr val="tx1"/>
+                      </a:solidFill>
+                      <a:prstDash val="solid"/>
+                      <a:round/>
+                      <a:headEnd type="none" w="med" len="med"/>
+                      <a:tailEnd type="none" w="med" len="med"/>
+                    </a:lnB>
+                  </a:tcPr>
                 </a:tc>
                 <a:tc>
                   <a:txBody>
@@ -6434,7 +7101,33 @@
                       <a:endParaRPr lang="zh-CN" altLang="en-US" dirty="0"/>
                     </a:p>
                   </a:txBody>
-                  <a:tcPr/>
+                  <a:tcPr>
+                    <a:lnL w="12700" cap="flat" cmpd="sng" algn="ctr">
+                      <a:noFill/>
+                      <a:prstDash val="solid"/>
+                      <a:round/>
+                      <a:headEnd type="none" w="med" len="med"/>
+                      <a:tailEnd type="none" w="med" len="med"/>
+                    </a:lnL>
+                    <a:lnT w="12700" cap="flat" cmpd="sng" algn="ctr">
+                      <a:solidFill>
+                        <a:schemeClr val="tx1"/>
+                      </a:solidFill>
+                      <a:prstDash val="solid"/>
+                      <a:round/>
+                      <a:headEnd type="none" w="med" len="med"/>
+                      <a:tailEnd type="none" w="med" len="med"/>
+                    </a:lnT>
+                    <a:lnB w="12700" cap="flat" cmpd="sng" algn="ctr">
+                      <a:solidFill>
+                        <a:schemeClr val="tx1"/>
+                      </a:solidFill>
+                      <a:prstDash val="solid"/>
+                      <a:round/>
+                      <a:headEnd type="none" w="med" len="med"/>
+                      <a:tailEnd type="none" w="med" len="med"/>
+                    </a:lnB>
+                  </a:tcPr>
                 </a:tc>
                 <a:extLst>
                   <a:ext uri="{0D108BD9-81ED-4DB2-BD59-A6C34878D82A}">
@@ -6456,7 +7149,33 @@
                       <a:endParaRPr lang="zh-CN" altLang="en-US" dirty="0"/>
                     </a:p>
                   </a:txBody>
-                  <a:tcPr/>
+                  <a:tcPr>
+                    <a:lnR w="12700" cap="flat" cmpd="sng" algn="ctr">
+                      <a:noFill/>
+                      <a:prstDash val="solid"/>
+                      <a:round/>
+                      <a:headEnd type="none" w="med" len="med"/>
+                      <a:tailEnd type="none" w="med" len="med"/>
+                    </a:lnR>
+                    <a:lnT w="12700" cap="flat" cmpd="sng" algn="ctr">
+                      <a:solidFill>
+                        <a:schemeClr val="tx1"/>
+                      </a:solidFill>
+                      <a:prstDash val="solid"/>
+                      <a:round/>
+                      <a:headEnd type="none" w="med" len="med"/>
+                      <a:tailEnd type="none" w="med" len="med"/>
+                    </a:lnT>
+                    <a:lnB w="12700" cap="flat" cmpd="sng" algn="ctr">
+                      <a:solidFill>
+                        <a:schemeClr val="tx1"/>
+                      </a:solidFill>
+                      <a:prstDash val="solid"/>
+                      <a:round/>
+                      <a:headEnd type="none" w="med" len="med"/>
+                      <a:tailEnd type="none" w="med" len="med"/>
+                    </a:lnB>
+                  </a:tcPr>
                 </a:tc>
                 <a:tc>
                   <a:txBody>
@@ -6487,7 +7206,33 @@
                       <a:endParaRPr lang="zh-CN" altLang="en-US" dirty="0"/>
                     </a:p>
                   </a:txBody>
-                  <a:tcPr/>
+                  <a:tcPr>
+                    <a:lnL w="12700" cap="flat" cmpd="sng" algn="ctr">
+                      <a:noFill/>
+                      <a:prstDash val="solid"/>
+                      <a:round/>
+                      <a:headEnd type="none" w="med" len="med"/>
+                      <a:tailEnd type="none" w="med" len="med"/>
+                    </a:lnL>
+                    <a:lnT w="12700" cap="flat" cmpd="sng" algn="ctr">
+                      <a:solidFill>
+                        <a:schemeClr val="tx1"/>
+                      </a:solidFill>
+                      <a:prstDash val="solid"/>
+                      <a:round/>
+                      <a:headEnd type="none" w="med" len="med"/>
+                      <a:tailEnd type="none" w="med" len="med"/>
+                    </a:lnT>
+                    <a:lnB w="12700" cap="flat" cmpd="sng" algn="ctr">
+                      <a:solidFill>
+                        <a:schemeClr val="tx1"/>
+                      </a:solidFill>
+                      <a:prstDash val="solid"/>
+                      <a:round/>
+                      <a:headEnd type="none" w="med" len="med"/>
+                      <a:tailEnd type="none" w="med" len="med"/>
+                    </a:lnB>
+                  </a:tcPr>
                 </a:tc>
                 <a:extLst>
                   <a:ext uri="{0D108BD9-81ED-4DB2-BD59-A6C34878D82A}">
@@ -6509,7 +7254,33 @@
                       <a:endParaRPr lang="zh-CN" altLang="en-US" dirty="0"/>
                     </a:p>
                   </a:txBody>
-                  <a:tcPr/>
+                  <a:tcPr>
+                    <a:lnR w="12700" cap="flat" cmpd="sng" algn="ctr">
+                      <a:noFill/>
+                      <a:prstDash val="solid"/>
+                      <a:round/>
+                      <a:headEnd type="none" w="med" len="med"/>
+                      <a:tailEnd type="none" w="med" len="med"/>
+                    </a:lnR>
+                    <a:lnT w="12700" cap="flat" cmpd="sng" algn="ctr">
+                      <a:solidFill>
+                        <a:schemeClr val="tx1"/>
+                      </a:solidFill>
+                      <a:prstDash val="solid"/>
+                      <a:round/>
+                      <a:headEnd type="none" w="med" len="med"/>
+                      <a:tailEnd type="none" w="med" len="med"/>
+                    </a:lnT>
+                    <a:lnB w="12700" cap="flat" cmpd="sng" algn="ctr">
+                      <a:solidFill>
+                        <a:schemeClr val="tx1"/>
+                      </a:solidFill>
+                      <a:prstDash val="solid"/>
+                      <a:round/>
+                      <a:headEnd type="none" w="med" len="med"/>
+                      <a:tailEnd type="none" w="med" len="med"/>
+                    </a:lnB>
+                  </a:tcPr>
                 </a:tc>
                 <a:tc>
                   <a:txBody>
@@ -6540,7 +7311,33 @@
                       <a:endParaRPr lang="zh-CN" altLang="en-US" dirty="0"/>
                     </a:p>
                   </a:txBody>
-                  <a:tcPr/>
+                  <a:tcPr>
+                    <a:lnL w="12700" cap="flat" cmpd="sng" algn="ctr">
+                      <a:noFill/>
+                      <a:prstDash val="solid"/>
+                      <a:round/>
+                      <a:headEnd type="none" w="med" len="med"/>
+                      <a:tailEnd type="none" w="med" len="med"/>
+                    </a:lnL>
+                    <a:lnT w="12700" cap="flat" cmpd="sng" algn="ctr">
+                      <a:solidFill>
+                        <a:schemeClr val="tx1"/>
+                      </a:solidFill>
+                      <a:prstDash val="solid"/>
+                      <a:round/>
+                      <a:headEnd type="none" w="med" len="med"/>
+                      <a:tailEnd type="none" w="med" len="med"/>
+                    </a:lnT>
+                    <a:lnB w="12700" cap="flat" cmpd="sng" algn="ctr">
+                      <a:solidFill>
+                        <a:schemeClr val="tx1"/>
+                      </a:solidFill>
+                      <a:prstDash val="solid"/>
+                      <a:round/>
+                      <a:headEnd type="none" w="med" len="med"/>
+                      <a:tailEnd type="none" w="med" len="med"/>
+                    </a:lnB>
+                  </a:tcPr>
                 </a:tc>
                 <a:extLst>
                   <a:ext uri="{0D108BD9-81ED-4DB2-BD59-A6C34878D82A}">
@@ -6562,7 +7359,33 @@
                       <a:endParaRPr lang="zh-CN" altLang="en-US" dirty="0"/>
                     </a:p>
                   </a:txBody>
-                  <a:tcPr/>
+                  <a:tcPr>
+                    <a:lnR w="12700" cap="flat" cmpd="sng" algn="ctr">
+                      <a:noFill/>
+                      <a:prstDash val="solid"/>
+                      <a:round/>
+                      <a:headEnd type="none" w="med" len="med"/>
+                      <a:tailEnd type="none" w="med" len="med"/>
+                    </a:lnR>
+                    <a:lnT w="12700" cap="flat" cmpd="sng" algn="ctr">
+                      <a:solidFill>
+                        <a:schemeClr val="tx1"/>
+                      </a:solidFill>
+                      <a:prstDash val="solid"/>
+                      <a:round/>
+                      <a:headEnd type="none" w="med" len="med"/>
+                      <a:tailEnd type="none" w="med" len="med"/>
+                    </a:lnT>
+                    <a:lnB w="12700" cap="flat" cmpd="sng" algn="ctr">
+                      <a:solidFill>
+                        <a:schemeClr val="tx1"/>
+                      </a:solidFill>
+                      <a:prstDash val="solid"/>
+                      <a:round/>
+                      <a:headEnd type="none" w="med" len="med"/>
+                      <a:tailEnd type="none" w="med" len="med"/>
+                    </a:lnB>
+                  </a:tcPr>
                 </a:tc>
                 <a:tc>
                   <a:txBody>
@@ -6593,7 +7416,33 @@
                       <a:endParaRPr lang="zh-CN" altLang="en-US" dirty="0"/>
                     </a:p>
                   </a:txBody>
-                  <a:tcPr/>
+                  <a:tcPr>
+                    <a:lnL w="12700" cap="flat" cmpd="sng" algn="ctr">
+                      <a:noFill/>
+                      <a:prstDash val="solid"/>
+                      <a:round/>
+                      <a:headEnd type="none" w="med" len="med"/>
+                      <a:tailEnd type="none" w="med" len="med"/>
+                    </a:lnL>
+                    <a:lnT w="12700" cap="flat" cmpd="sng" algn="ctr">
+                      <a:solidFill>
+                        <a:schemeClr val="tx1"/>
+                      </a:solidFill>
+                      <a:prstDash val="solid"/>
+                      <a:round/>
+                      <a:headEnd type="none" w="med" len="med"/>
+                      <a:tailEnd type="none" w="med" len="med"/>
+                    </a:lnT>
+                    <a:lnB w="12700" cap="flat" cmpd="sng" algn="ctr">
+                      <a:solidFill>
+                        <a:schemeClr val="tx1"/>
+                      </a:solidFill>
+                      <a:prstDash val="solid"/>
+                      <a:round/>
+                      <a:headEnd type="none" w="med" len="med"/>
+                      <a:tailEnd type="none" w="med" len="med"/>
+                    </a:lnB>
+                  </a:tcPr>
                 </a:tc>
                 <a:extLst>
                   <a:ext uri="{0D108BD9-81ED-4DB2-BD59-A6C34878D82A}">
@@ -6615,7 +7464,24 @@
                       <a:endParaRPr lang="zh-CN" altLang="en-US" dirty="0"/>
                     </a:p>
                   </a:txBody>
-                  <a:tcPr/>
+                  <a:tcPr>
+                    <a:lnR w="12700" cap="flat" cmpd="sng" algn="ctr">
+                      <a:noFill/>
+                      <a:prstDash val="solid"/>
+                      <a:round/>
+                      <a:headEnd type="none" w="med" len="med"/>
+                      <a:tailEnd type="none" w="med" len="med"/>
+                    </a:lnR>
+                    <a:lnT w="12700" cap="flat" cmpd="sng" algn="ctr">
+                      <a:solidFill>
+                        <a:schemeClr val="tx1"/>
+                      </a:solidFill>
+                      <a:prstDash val="solid"/>
+                      <a:round/>
+                      <a:headEnd type="none" w="med" len="med"/>
+                      <a:tailEnd type="none" w="med" len="med"/>
+                    </a:lnT>
+                  </a:tcPr>
                 </a:tc>
                 <a:tc>
                   <a:txBody>
@@ -6646,7 +7512,24 @@
                       <a:endParaRPr lang="zh-CN" altLang="en-US" dirty="0"/>
                     </a:p>
                   </a:txBody>
-                  <a:tcPr/>
+                  <a:tcPr>
+                    <a:lnL w="12700" cap="flat" cmpd="sng" algn="ctr">
+                      <a:noFill/>
+                      <a:prstDash val="solid"/>
+                      <a:round/>
+                      <a:headEnd type="none" w="med" len="med"/>
+                      <a:tailEnd type="none" w="med" len="med"/>
+                    </a:lnL>
+                    <a:lnT w="12700" cap="flat" cmpd="sng" algn="ctr">
+                      <a:solidFill>
+                        <a:schemeClr val="tx1"/>
+                      </a:solidFill>
+                      <a:prstDash val="solid"/>
+                      <a:round/>
+                      <a:headEnd type="none" w="med" len="med"/>
+                      <a:tailEnd type="none" w="med" len="med"/>
+                    </a:lnT>
+                  </a:tcPr>
                 </a:tc>
                 <a:extLst>
                   <a:ext uri="{0D108BD9-81ED-4DB2-BD59-A6C34878D82A}">
@@ -6671,7 +7554,7 @@
 </p:sld>
 </file>
 
-<file path=ppt/slides/slide6.xml><?xml version="1.0" encoding="utf-8"?>
+<file path=ppt/slides/slide5.xml><?xml version="1.0" encoding="utf-8"?>
 <p:sld xmlns:a="http://schemas.openxmlformats.org/drawingml/2006/main" xmlns:r="http://schemas.openxmlformats.org/officeDocument/2006/relationships" xmlns:p="http://schemas.openxmlformats.org/presentationml/2006/main">
   <p:cSld>
     <p:spTree>
@@ -6703,14 +7586,14 @@
           <p:nvPr>
             <p:extLst>
               <p:ext uri="{D42A27DB-BD31-4B8C-83A1-F6EECF244321}">
-                <p14:modId xmlns:p14="http://schemas.microsoft.com/office/powerpoint/2010/main" val="1352018265"/>
+                <p14:modId xmlns:p14="http://schemas.microsoft.com/office/powerpoint/2010/main" val="59396876"/>
               </p:ext>
             </p:extLst>
           </p:nvPr>
         </p:nvGraphicFramePr>
         <p:xfrm>
           <a:off x="1431248" y="2012593"/>
-          <a:ext cx="4800876" cy="1483360"/>
+          <a:ext cx="5555478" cy="1483360"/>
         </p:xfrm>
         <a:graphic>
           <a:graphicData uri="http://schemas.openxmlformats.org/drawingml/2006/table">
@@ -6726,7 +7609,7 @@
                     </a:ext>
                   </a:extLst>
                 </a:gridCol>
-                <a:gridCol w="4216893">
+                <a:gridCol w="4971495">
                   <a:extLst>
                     <a:ext uri="{9D8B030D-6E8A-4147-A177-3AD203B41FA5}">
                       <a16:colId xmlns:a16="http://schemas.microsoft.com/office/drawing/2014/main" val="1095208800"/>
@@ -6748,7 +7631,24 @@
                       <a:endParaRPr lang="zh-CN" altLang="en-US" dirty="0"/>
                     </a:p>
                   </a:txBody>
-                  <a:tcPr/>
+                  <a:tcPr>
+                    <a:lnR w="12700" cap="flat" cmpd="sng" algn="ctr">
+                      <a:noFill/>
+                      <a:prstDash val="solid"/>
+                      <a:round/>
+                      <a:headEnd type="none" w="med" len="med"/>
+                      <a:tailEnd type="none" w="med" len="med"/>
+                    </a:lnR>
+                    <a:lnB w="12700" cap="flat" cmpd="sng" algn="ctr">
+                      <a:solidFill>
+                        <a:schemeClr val="tx1"/>
+                      </a:solidFill>
+                      <a:prstDash val="solid"/>
+                      <a:round/>
+                      <a:headEnd type="none" w="med" len="med"/>
+                      <a:tailEnd type="none" w="med" len="med"/>
+                    </a:lnB>
+                  </a:tcPr>
                 </a:tc>
                 <a:tc>
                   <a:txBody>
@@ -6757,12 +7657,45 @@
                     <a:p>
                       <a:r>
                         <a:rPr lang="en-US" altLang="zh-CN" dirty="0"/>
-                        <a:t>String p = request.getParameter(“ssrf");</a:t>
+                        <a:t>String p = </a:t>
+                      </a:r>
+                      <a:r>
+                        <a:rPr lang="en-US" altLang="zh-CN" dirty="0" err="1"/>
+                        <a:t>request.getParameter</a:t>
+                      </a:r>
+                      <a:r>
+                        <a:rPr lang="en-US" altLang="zh-CN" dirty="0"/>
+                        <a:t>(“</a:t>
+                      </a:r>
+                      <a:r>
+                        <a:rPr lang="en-US" altLang="zh-CN" dirty="0" err="1"/>
+                        <a:t>ssrf</a:t>
+                      </a:r>
+                      <a:r>
+                        <a:rPr lang="en-US" altLang="zh-CN" dirty="0"/>
+                        <a:t>");</a:t>
                       </a:r>
                       <a:endParaRPr lang="zh-CN" altLang="en-US" dirty="0"/>
                     </a:p>
                   </a:txBody>
-                  <a:tcPr/>
+                  <a:tcPr>
+                    <a:lnL w="12700" cap="flat" cmpd="sng" algn="ctr">
+                      <a:noFill/>
+                      <a:prstDash val="solid"/>
+                      <a:round/>
+                      <a:headEnd type="none" w="med" len="med"/>
+                      <a:tailEnd type="none" w="med" len="med"/>
+                    </a:lnL>
+                    <a:lnB w="12700" cap="flat" cmpd="sng" algn="ctr">
+                      <a:solidFill>
+                        <a:schemeClr val="tx1"/>
+                      </a:solidFill>
+                      <a:prstDash val="solid"/>
+                      <a:round/>
+                      <a:headEnd type="none" w="med" len="med"/>
+                      <a:tailEnd type="none" w="med" len="med"/>
+                    </a:lnB>
+                  </a:tcPr>
                 </a:tc>
                 <a:extLst>
                   <a:ext uri="{0D108BD9-81ED-4DB2-BD59-A6C34878D82A}">
@@ -6784,7 +7717,33 @@
                       <a:endParaRPr lang="zh-CN" altLang="en-US" dirty="0"/>
                     </a:p>
                   </a:txBody>
-                  <a:tcPr/>
+                  <a:tcPr>
+                    <a:lnR w="12700" cap="flat" cmpd="sng" algn="ctr">
+                      <a:noFill/>
+                      <a:prstDash val="solid"/>
+                      <a:round/>
+                      <a:headEnd type="none" w="med" len="med"/>
+                      <a:tailEnd type="none" w="med" len="med"/>
+                    </a:lnR>
+                    <a:lnT w="12700" cap="flat" cmpd="sng" algn="ctr">
+                      <a:solidFill>
+                        <a:schemeClr val="tx1"/>
+                      </a:solidFill>
+                      <a:prstDash val="solid"/>
+                      <a:round/>
+                      <a:headEnd type="none" w="med" len="med"/>
+                      <a:tailEnd type="none" w="med" len="med"/>
+                    </a:lnT>
+                    <a:lnB w="12700" cap="flat" cmpd="sng" algn="ctr">
+                      <a:solidFill>
+                        <a:schemeClr val="tx1"/>
+                      </a:solidFill>
+                      <a:prstDash val="solid"/>
+                      <a:round/>
+                      <a:headEnd type="none" w="med" len="med"/>
+                      <a:tailEnd type="none" w="med" len="med"/>
+                    </a:lnB>
+                  </a:tcPr>
                 </a:tc>
                 <a:tc>
                   <a:txBody>
@@ -6815,7 +7774,33 @@
                       <a:endParaRPr lang="zh-CN" altLang="en-US" dirty="0"/>
                     </a:p>
                   </a:txBody>
-                  <a:tcPr/>
+                  <a:tcPr>
+                    <a:lnL w="12700" cap="flat" cmpd="sng" algn="ctr">
+                      <a:noFill/>
+                      <a:prstDash val="solid"/>
+                      <a:round/>
+                      <a:headEnd type="none" w="med" len="med"/>
+                      <a:tailEnd type="none" w="med" len="med"/>
+                    </a:lnL>
+                    <a:lnT w="12700" cap="flat" cmpd="sng" algn="ctr">
+                      <a:solidFill>
+                        <a:schemeClr val="tx1"/>
+                      </a:solidFill>
+                      <a:prstDash val="solid"/>
+                      <a:round/>
+                      <a:headEnd type="none" w="med" len="med"/>
+                      <a:tailEnd type="none" w="med" len="med"/>
+                    </a:lnT>
+                    <a:lnB w="12700" cap="flat" cmpd="sng" algn="ctr">
+                      <a:solidFill>
+                        <a:schemeClr val="tx1"/>
+                      </a:solidFill>
+                      <a:prstDash val="solid"/>
+                      <a:round/>
+                      <a:headEnd type="none" w="med" len="med"/>
+                      <a:tailEnd type="none" w="med" len="med"/>
+                    </a:lnB>
+                  </a:tcPr>
                 </a:tc>
                 <a:extLst>
                   <a:ext uri="{0D108BD9-81ED-4DB2-BD59-A6C34878D82A}">
@@ -6837,7 +7822,33 @@
                       <a:endParaRPr lang="zh-CN" altLang="en-US" dirty="0"/>
                     </a:p>
                   </a:txBody>
-                  <a:tcPr/>
+                  <a:tcPr>
+                    <a:lnR w="12700" cap="flat" cmpd="sng" algn="ctr">
+                      <a:noFill/>
+                      <a:prstDash val="solid"/>
+                      <a:round/>
+                      <a:headEnd type="none" w="med" len="med"/>
+                      <a:tailEnd type="none" w="med" len="med"/>
+                    </a:lnR>
+                    <a:lnT w="12700" cap="flat" cmpd="sng" algn="ctr">
+                      <a:solidFill>
+                        <a:schemeClr val="tx1"/>
+                      </a:solidFill>
+                      <a:prstDash val="solid"/>
+                      <a:round/>
+                      <a:headEnd type="none" w="med" len="med"/>
+                      <a:tailEnd type="none" w="med" len="med"/>
+                    </a:lnT>
+                    <a:lnB w="12700" cap="flat" cmpd="sng" algn="ctr">
+                      <a:solidFill>
+                        <a:schemeClr val="tx1"/>
+                      </a:solidFill>
+                      <a:prstDash val="solid"/>
+                      <a:round/>
+                      <a:headEnd type="none" w="med" len="med"/>
+                      <a:tailEnd type="none" w="med" len="med"/>
+                    </a:lnB>
+                  </a:tcPr>
                 </a:tc>
                 <a:tc>
                   <a:txBody>
@@ -6868,7 +7879,33 @@
                       <a:endParaRPr lang="zh-CN" altLang="en-US" dirty="0"/>
                     </a:p>
                   </a:txBody>
-                  <a:tcPr/>
+                  <a:tcPr>
+                    <a:lnL w="12700" cap="flat" cmpd="sng" algn="ctr">
+                      <a:noFill/>
+                      <a:prstDash val="solid"/>
+                      <a:round/>
+                      <a:headEnd type="none" w="med" len="med"/>
+                      <a:tailEnd type="none" w="med" len="med"/>
+                    </a:lnL>
+                    <a:lnT w="12700" cap="flat" cmpd="sng" algn="ctr">
+                      <a:solidFill>
+                        <a:schemeClr val="tx1"/>
+                      </a:solidFill>
+                      <a:prstDash val="solid"/>
+                      <a:round/>
+                      <a:headEnd type="none" w="med" len="med"/>
+                      <a:tailEnd type="none" w="med" len="med"/>
+                    </a:lnT>
+                    <a:lnB w="12700" cap="flat" cmpd="sng" algn="ctr">
+                      <a:solidFill>
+                        <a:schemeClr val="tx1"/>
+                      </a:solidFill>
+                      <a:prstDash val="solid"/>
+                      <a:round/>
+                      <a:headEnd type="none" w="med" len="med"/>
+                      <a:tailEnd type="none" w="med" len="med"/>
+                    </a:lnB>
+                  </a:tcPr>
                 </a:tc>
                 <a:extLst>
                   <a:ext uri="{0D108BD9-81ED-4DB2-BD59-A6C34878D82A}">
@@ -6890,7 +7927,33 @@
                       <a:endParaRPr lang="zh-CN" altLang="en-US" dirty="0"/>
                     </a:p>
                   </a:txBody>
-                  <a:tcPr/>
+                  <a:tcPr>
+                    <a:lnR w="12700" cap="flat" cmpd="sng" algn="ctr">
+                      <a:noFill/>
+                      <a:prstDash val="solid"/>
+                      <a:round/>
+                      <a:headEnd type="none" w="med" len="med"/>
+                      <a:tailEnd type="none" w="med" len="med"/>
+                    </a:lnR>
+                    <a:lnT w="12700" cap="flat" cmpd="sng" algn="ctr">
+                      <a:solidFill>
+                        <a:schemeClr val="tx1"/>
+                      </a:solidFill>
+                      <a:prstDash val="solid"/>
+                      <a:round/>
+                      <a:headEnd type="none" w="med" len="med"/>
+                      <a:tailEnd type="none" w="med" len="med"/>
+                    </a:lnT>
+                    <a:lnB w="12700" cap="flat" cmpd="sng" algn="ctr">
+                      <a:solidFill>
+                        <a:schemeClr val="tx1"/>
+                      </a:solidFill>
+                      <a:prstDash val="solid"/>
+                      <a:round/>
+                      <a:headEnd type="none" w="med" len="med"/>
+                      <a:tailEnd type="none" w="med" len="med"/>
+                    </a:lnB>
+                  </a:tcPr>
                 </a:tc>
                 <a:tc>
                   <a:txBody>
@@ -6915,13 +7978,43 @@
                         <a:defRPr/>
                       </a:pPr>
                       <a:r>
+                        <a:rPr lang="en-US" altLang="zh-CN" dirty="0" err="1"/>
+                        <a:t>u.openConnection</a:t>
+                      </a:r>
+                      <a:r>
                         <a:rPr lang="en-US" altLang="zh-CN" dirty="0"/>
-                        <a:t>u.openConnection();</a:t>
+                        <a:t>();</a:t>
                       </a:r>
                       <a:endParaRPr lang="zh-CN" altLang="en-US" dirty="0"/>
                     </a:p>
                   </a:txBody>
-                  <a:tcPr/>
+                  <a:tcPr>
+                    <a:lnL w="12700" cap="flat" cmpd="sng" algn="ctr">
+                      <a:noFill/>
+                      <a:prstDash val="solid"/>
+                      <a:round/>
+                      <a:headEnd type="none" w="med" len="med"/>
+                      <a:tailEnd type="none" w="med" len="med"/>
+                    </a:lnL>
+                    <a:lnT w="12700" cap="flat" cmpd="sng" algn="ctr">
+                      <a:solidFill>
+                        <a:schemeClr val="tx1"/>
+                      </a:solidFill>
+                      <a:prstDash val="solid"/>
+                      <a:round/>
+                      <a:headEnd type="none" w="med" len="med"/>
+                      <a:tailEnd type="none" w="med" len="med"/>
+                    </a:lnT>
+                    <a:lnB w="12700" cap="flat" cmpd="sng" algn="ctr">
+                      <a:solidFill>
+                        <a:schemeClr val="tx1"/>
+                      </a:solidFill>
+                      <a:prstDash val="solid"/>
+                      <a:round/>
+                      <a:headEnd type="none" w="med" len="med"/>
+                      <a:tailEnd type="none" w="med" len="med"/>
+                    </a:lnB>
+                  </a:tcPr>
                 </a:tc>
                 <a:extLst>
                   <a:ext uri="{0D108BD9-81ED-4DB2-BD59-A6C34878D82A}">
@@ -6936,7 +8029,7 @@
     </p:spTree>
     <p:extLst>
       <p:ext uri="{BB962C8B-B14F-4D97-AF65-F5344CB8AC3E}">
-        <p14:creationId xmlns:p14="http://schemas.microsoft.com/office/powerpoint/2010/main" val="3514936461"/>
+        <p14:creationId xmlns:p14="http://schemas.microsoft.com/office/powerpoint/2010/main" val="86971869"/>
       </p:ext>
     </p:extLst>
   </p:cSld>
@@ -6946,7 +8039,7 @@
 </p:sld>
 </file>
 
-<file path=ppt/slides/slide7.xml><?xml version="1.0" encoding="utf-8"?>
+<file path=ppt/slides/slide6.xml><?xml version="1.0" encoding="utf-8"?>
 <p:sld xmlns:a="http://schemas.openxmlformats.org/drawingml/2006/main" xmlns:r="http://schemas.openxmlformats.org/officeDocument/2006/relationships" xmlns:p="http://schemas.openxmlformats.org/presentationml/2006/main">
   <p:cSld>
     <p:spTree>
@@ -6978,14 +8071,14 @@
           <p:nvPr>
             <p:extLst>
               <p:ext uri="{D42A27DB-BD31-4B8C-83A1-F6EECF244321}">
-                <p14:modId xmlns:p14="http://schemas.microsoft.com/office/powerpoint/2010/main" val="1524739417"/>
+                <p14:modId xmlns:p14="http://schemas.microsoft.com/office/powerpoint/2010/main" val="2961380892"/>
               </p:ext>
             </p:extLst>
           </p:nvPr>
         </p:nvGraphicFramePr>
         <p:xfrm>
           <a:off x="1431248" y="2012593"/>
-          <a:ext cx="4800876" cy="2209800"/>
+          <a:ext cx="5555478" cy="2219960"/>
         </p:xfrm>
         <a:graphic>
           <a:graphicData uri="http://schemas.openxmlformats.org/drawingml/2006/table">
@@ -7001,7 +8094,7 @@
                     </a:ext>
                   </a:extLst>
                 </a:gridCol>
-                <a:gridCol w="4216893">
+                <a:gridCol w="4971495">
                   <a:extLst>
                     <a:ext uri="{9D8B030D-6E8A-4147-A177-3AD203B41FA5}">
                       <a16:colId xmlns:a16="http://schemas.microsoft.com/office/drawing/2014/main" val="1095208800"/>
@@ -7023,7 +8116,24 @@
                       <a:endParaRPr lang="zh-CN" altLang="en-US" dirty="0"/>
                     </a:p>
                   </a:txBody>
-                  <a:tcPr/>
+                  <a:tcPr>
+                    <a:lnR w="12700" cap="flat" cmpd="sng" algn="ctr">
+                      <a:noFill/>
+                      <a:prstDash val="solid"/>
+                      <a:round/>
+                      <a:headEnd type="none" w="med" len="med"/>
+                      <a:tailEnd type="none" w="med" len="med"/>
+                    </a:lnR>
+                    <a:lnB w="12700" cap="flat" cmpd="sng" algn="ctr">
+                      <a:solidFill>
+                        <a:schemeClr val="tx1"/>
+                      </a:solidFill>
+                      <a:prstDash val="solid"/>
+                      <a:round/>
+                      <a:headEnd type="none" w="med" len="med"/>
+                      <a:tailEnd type="none" w="med" len="med"/>
+                    </a:lnB>
+                  </a:tcPr>
                 </a:tc>
                 <a:tc>
                   <a:txBody>
@@ -7032,12 +8142,45 @@
                     <a:p>
                       <a:r>
                         <a:rPr lang="en-US" altLang="zh-CN" dirty="0"/>
-                        <a:t>String p = request.getParameter(“url");</a:t>
+                        <a:t>String p = </a:t>
+                      </a:r>
+                      <a:r>
+                        <a:rPr lang="en-US" altLang="zh-CN" dirty="0" err="1"/>
+                        <a:t>request.getParameter</a:t>
+                      </a:r>
+                      <a:r>
+                        <a:rPr lang="en-US" altLang="zh-CN" dirty="0"/>
+                        <a:t>(“</a:t>
+                      </a:r>
+                      <a:r>
+                        <a:rPr lang="en-US" altLang="zh-CN" dirty="0" err="1"/>
+                        <a:t>url</a:t>
+                      </a:r>
+                      <a:r>
+                        <a:rPr lang="en-US" altLang="zh-CN" dirty="0"/>
+                        <a:t>");</a:t>
                       </a:r>
                       <a:endParaRPr lang="zh-CN" altLang="en-US" dirty="0"/>
                     </a:p>
                   </a:txBody>
-                  <a:tcPr/>
+                  <a:tcPr>
+                    <a:lnL w="12700" cap="flat" cmpd="sng" algn="ctr">
+                      <a:noFill/>
+                      <a:prstDash val="solid"/>
+                      <a:round/>
+                      <a:headEnd type="none" w="med" len="med"/>
+                      <a:tailEnd type="none" w="med" len="med"/>
+                    </a:lnL>
+                    <a:lnB w="12700" cap="flat" cmpd="sng" algn="ctr">
+                      <a:solidFill>
+                        <a:schemeClr val="tx1"/>
+                      </a:solidFill>
+                      <a:prstDash val="solid"/>
+                      <a:round/>
+                      <a:headEnd type="none" w="med" len="med"/>
+                      <a:tailEnd type="none" w="med" len="med"/>
+                    </a:lnB>
+                  </a:tcPr>
                 </a:tc>
                 <a:extLst>
                   <a:ext uri="{0D108BD9-81ED-4DB2-BD59-A6C34878D82A}">
@@ -7059,7 +8202,33 @@
                       <a:endParaRPr lang="zh-CN" altLang="en-US" dirty="0"/>
                     </a:p>
                   </a:txBody>
-                  <a:tcPr/>
+                  <a:tcPr>
+                    <a:lnR w="12700" cap="flat" cmpd="sng" algn="ctr">
+                      <a:noFill/>
+                      <a:prstDash val="solid"/>
+                      <a:round/>
+                      <a:headEnd type="none" w="med" len="med"/>
+                      <a:tailEnd type="none" w="med" len="med"/>
+                    </a:lnR>
+                    <a:lnT w="12700" cap="flat" cmpd="sng" algn="ctr">
+                      <a:solidFill>
+                        <a:schemeClr val="tx1"/>
+                      </a:solidFill>
+                      <a:prstDash val="solid"/>
+                      <a:round/>
+                      <a:headEnd type="none" w="med" len="med"/>
+                      <a:tailEnd type="none" w="med" len="med"/>
+                    </a:lnT>
+                    <a:lnB w="12700" cap="flat" cmpd="sng" algn="ctr">
+                      <a:solidFill>
+                        <a:schemeClr val="tx1"/>
+                      </a:solidFill>
+                      <a:prstDash val="solid"/>
+                      <a:round/>
+                      <a:headEnd type="none" w="med" len="med"/>
+                      <a:tailEnd type="none" w="med" len="med"/>
+                    </a:lnB>
+                  </a:tcPr>
                 </a:tc>
                 <a:tc>
                   <a:txBody>
@@ -7090,7 +8259,33 @@
                       <a:endParaRPr lang="zh-CN" altLang="en-US" dirty="0"/>
                     </a:p>
                   </a:txBody>
-                  <a:tcPr/>
+                  <a:tcPr>
+                    <a:lnL w="12700" cap="flat" cmpd="sng" algn="ctr">
+                      <a:noFill/>
+                      <a:prstDash val="solid"/>
+                      <a:round/>
+                      <a:headEnd type="none" w="med" len="med"/>
+                      <a:tailEnd type="none" w="med" len="med"/>
+                    </a:lnL>
+                    <a:lnT w="12700" cap="flat" cmpd="sng" algn="ctr">
+                      <a:solidFill>
+                        <a:schemeClr val="tx1"/>
+                      </a:solidFill>
+                      <a:prstDash val="solid"/>
+                      <a:round/>
+                      <a:headEnd type="none" w="med" len="med"/>
+                      <a:tailEnd type="none" w="med" len="med"/>
+                    </a:lnT>
+                    <a:lnB w="12700" cap="flat" cmpd="sng" algn="ctr">
+                      <a:solidFill>
+                        <a:schemeClr val="tx1"/>
+                      </a:solidFill>
+                      <a:prstDash val="solid"/>
+                      <a:round/>
+                      <a:headEnd type="none" w="med" len="med"/>
+                      <a:tailEnd type="none" w="med" len="med"/>
+                    </a:lnB>
+                  </a:tcPr>
                 </a:tc>
                 <a:extLst>
                   <a:ext uri="{0D108BD9-81ED-4DB2-BD59-A6C34878D82A}">
@@ -7098,7 +8293,7 @@
                   </a:ext>
                 </a:extLst>
               </a:tr>
-              <a:tr h="185420">
+              <a:tr h="370840">
                 <a:tc>
                   <a:txBody>
                     <a:bodyPr/>
@@ -7112,7 +8307,33 @@
                       <a:endParaRPr lang="zh-CN" altLang="en-US" dirty="0"/>
                     </a:p>
                   </a:txBody>
-                  <a:tcPr/>
+                  <a:tcPr>
+                    <a:lnR w="12700" cap="flat" cmpd="sng" algn="ctr">
+                      <a:noFill/>
+                      <a:prstDash val="solid"/>
+                      <a:round/>
+                      <a:headEnd type="none" w="med" len="med"/>
+                      <a:tailEnd type="none" w="med" len="med"/>
+                    </a:lnR>
+                    <a:lnT w="12700" cap="flat" cmpd="sng" algn="ctr">
+                      <a:solidFill>
+                        <a:schemeClr val="tx1"/>
+                      </a:solidFill>
+                      <a:prstDash val="solid"/>
+                      <a:round/>
+                      <a:headEnd type="none" w="med" len="med"/>
+                      <a:tailEnd type="none" w="med" len="med"/>
+                    </a:lnT>
+                    <a:lnB w="12700" cap="flat" cmpd="sng" algn="ctr">
+                      <a:solidFill>
+                        <a:schemeClr val="tx1"/>
+                      </a:solidFill>
+                      <a:prstDash val="solid"/>
+                      <a:round/>
+                      <a:headEnd type="none" w="med" len="med"/>
+                      <a:tailEnd type="none" w="med" len="med"/>
+                    </a:lnB>
+                  </a:tcPr>
                 </a:tc>
                 <a:tc>
                   <a:txBody>
@@ -7138,12 +8359,46 @@
                       </a:pPr>
                       <a:r>
                         <a:rPr lang="en-US" altLang="zh-CN" dirty="0"/>
-                        <a:t>Boolean b=isInnerIP(u);</a:t>
+                        <a:t>Boolean b=</a:t>
+                      </a:r>
+                      <a:r>
+                        <a:rPr lang="en-US" altLang="zh-CN" dirty="0" err="1"/>
+                        <a:t>isInnerIP</a:t>
+                      </a:r>
+                      <a:r>
+                        <a:rPr lang="en-US" altLang="zh-CN" dirty="0"/>
+                        <a:t>(u);</a:t>
                       </a:r>
                       <a:endParaRPr lang="zh-CN" altLang="en-US" dirty="0"/>
                     </a:p>
                   </a:txBody>
-                  <a:tcPr/>
+                  <a:tcPr>
+                    <a:lnL w="12700" cap="flat" cmpd="sng" algn="ctr">
+                      <a:noFill/>
+                      <a:prstDash val="solid"/>
+                      <a:round/>
+                      <a:headEnd type="none" w="med" len="med"/>
+                      <a:tailEnd type="none" w="med" len="med"/>
+                    </a:lnL>
+                    <a:lnT w="12700" cap="flat" cmpd="sng" algn="ctr">
+                      <a:solidFill>
+                        <a:schemeClr val="tx1"/>
+                      </a:solidFill>
+                      <a:prstDash val="solid"/>
+                      <a:round/>
+                      <a:headEnd type="none" w="med" len="med"/>
+                      <a:tailEnd type="none" w="med" len="med"/>
+                    </a:lnT>
+                    <a:lnB w="12700" cap="flat" cmpd="sng" algn="ctr">
+                      <a:solidFill>
+                        <a:schemeClr val="tx1"/>
+                      </a:solidFill>
+                      <a:prstDash val="solid"/>
+                      <a:round/>
+                      <a:headEnd type="none" w="med" len="med"/>
+                      <a:tailEnd type="none" w="med" len="med"/>
+                    </a:lnB>
+                  </a:tcPr>
                 </a:tc>
                 <a:extLst>
                   <a:ext uri="{0D108BD9-81ED-4DB2-BD59-A6C34878D82A}">
@@ -7151,7 +8406,7 @@
                   </a:ext>
                 </a:extLst>
               </a:tr>
-              <a:tr h="182880">
+              <a:tr h="370840">
                 <a:tc>
                   <a:txBody>
                     <a:bodyPr/>
@@ -7165,7 +8420,33 @@
                       <a:endParaRPr lang="zh-CN" altLang="en-US" dirty="0"/>
                     </a:p>
                   </a:txBody>
-                  <a:tcPr/>
+                  <a:tcPr>
+                    <a:lnR w="12700" cap="flat" cmpd="sng" algn="ctr">
+                      <a:noFill/>
+                      <a:prstDash val="solid"/>
+                      <a:round/>
+                      <a:headEnd type="none" w="med" len="med"/>
+                      <a:tailEnd type="none" w="med" len="med"/>
+                    </a:lnR>
+                    <a:lnT w="12700" cap="flat" cmpd="sng" algn="ctr">
+                      <a:solidFill>
+                        <a:schemeClr val="tx1"/>
+                      </a:solidFill>
+                      <a:prstDash val="solid"/>
+                      <a:round/>
+                      <a:headEnd type="none" w="med" len="med"/>
+                      <a:tailEnd type="none" w="med" len="med"/>
+                    </a:lnT>
+                    <a:lnB w="12700" cap="flat" cmpd="sng" algn="ctr">
+                      <a:solidFill>
+                        <a:schemeClr val="tx1"/>
+                      </a:solidFill>
+                      <a:prstDash val="solid"/>
+                      <a:round/>
+                      <a:headEnd type="none" w="med" len="med"/>
+                      <a:tailEnd type="none" w="med" len="med"/>
+                    </a:lnB>
+                  </a:tcPr>
                 </a:tc>
                 <a:tc>
                   <a:txBody>
@@ -7196,15 +8477,41 @@
                       <a:endParaRPr lang="zh-CN" altLang="en-US" dirty="0"/>
                     </a:p>
                   </a:txBody>
-                  <a:tcPr/>
+                  <a:tcPr>
+                    <a:lnL w="12700" cap="flat" cmpd="sng" algn="ctr">
+                      <a:noFill/>
+                      <a:prstDash val="solid"/>
+                      <a:round/>
+                      <a:headEnd type="none" w="med" len="med"/>
+                      <a:tailEnd type="none" w="med" len="med"/>
+                    </a:lnL>
+                    <a:lnT w="12700" cap="flat" cmpd="sng" algn="ctr">
+                      <a:solidFill>
+                        <a:schemeClr val="tx1"/>
+                      </a:solidFill>
+                      <a:prstDash val="solid"/>
+                      <a:round/>
+                      <a:headEnd type="none" w="med" len="med"/>
+                      <a:tailEnd type="none" w="med" len="med"/>
+                    </a:lnT>
+                    <a:lnB w="12700" cap="flat" cmpd="sng" algn="ctr">
+                      <a:solidFill>
+                        <a:schemeClr val="tx1"/>
+                      </a:solidFill>
+                      <a:prstDash val="solid"/>
+                      <a:round/>
+                      <a:headEnd type="none" w="med" len="med"/>
+                      <a:tailEnd type="none" w="med" len="med"/>
+                    </a:lnB>
+                  </a:tcPr>
                 </a:tc>
                 <a:extLst>
                   <a:ext uri="{0D108BD9-81ED-4DB2-BD59-A6C34878D82A}">
-                    <a16:rowId xmlns:a16="http://schemas.microsoft.com/office/drawing/2014/main" val="595988097"/>
+                    <a16:rowId xmlns:a16="http://schemas.microsoft.com/office/drawing/2014/main" val="3578168134"/>
                   </a:ext>
                 </a:extLst>
               </a:tr>
-              <a:tr h="182880">
+              <a:tr h="370840">
                 <a:tc>
                   <a:txBody>
                     <a:bodyPr/>
@@ -7218,7 +8525,33 @@
                       <a:endParaRPr lang="zh-CN" altLang="en-US" dirty="0"/>
                     </a:p>
                   </a:txBody>
-                  <a:tcPr/>
+                  <a:tcPr>
+                    <a:lnR w="12700" cap="flat" cmpd="sng" algn="ctr">
+                      <a:noFill/>
+                      <a:prstDash val="solid"/>
+                      <a:round/>
+                      <a:headEnd type="none" w="med" len="med"/>
+                      <a:tailEnd type="none" w="med" len="med"/>
+                    </a:lnR>
+                    <a:lnT w="12700" cap="flat" cmpd="sng" algn="ctr">
+                      <a:solidFill>
+                        <a:schemeClr val="tx1"/>
+                      </a:solidFill>
+                      <a:prstDash val="solid"/>
+                      <a:round/>
+                      <a:headEnd type="none" w="med" len="med"/>
+                      <a:tailEnd type="none" w="med" len="med"/>
+                    </a:lnT>
+                    <a:lnB w="12700" cap="flat" cmpd="sng" algn="ctr">
+                      <a:solidFill>
+                        <a:schemeClr val="tx1"/>
+                      </a:solidFill>
+                      <a:prstDash val="solid"/>
+                      <a:round/>
+                      <a:headEnd type="none" w="med" len="med"/>
+                      <a:tailEnd type="none" w="med" len="med"/>
+                    </a:lnB>
+                  </a:tcPr>
                 </a:tc>
                 <a:tc>
                   <a:txBody>
@@ -7249,15 +8582,41 @@
                       <a:endParaRPr lang="zh-CN" altLang="en-US" dirty="0"/>
                     </a:p>
                   </a:txBody>
-                  <a:tcPr/>
+                  <a:tcPr>
+                    <a:lnL w="12700" cap="flat" cmpd="sng" algn="ctr">
+                      <a:noFill/>
+                      <a:prstDash val="solid"/>
+                      <a:round/>
+                      <a:headEnd type="none" w="med" len="med"/>
+                      <a:tailEnd type="none" w="med" len="med"/>
+                    </a:lnL>
+                    <a:lnT w="12700" cap="flat" cmpd="sng" algn="ctr">
+                      <a:solidFill>
+                        <a:schemeClr val="tx1"/>
+                      </a:solidFill>
+                      <a:prstDash val="solid"/>
+                      <a:round/>
+                      <a:headEnd type="none" w="med" len="med"/>
+                      <a:tailEnd type="none" w="med" len="med"/>
+                    </a:lnT>
+                    <a:lnB w="12700" cap="flat" cmpd="sng" algn="ctr">
+                      <a:solidFill>
+                        <a:schemeClr val="tx1"/>
+                      </a:solidFill>
+                      <a:prstDash val="solid"/>
+                      <a:round/>
+                      <a:headEnd type="none" w="med" len="med"/>
+                      <a:tailEnd type="none" w="med" len="med"/>
+                    </a:lnB>
+                  </a:tcPr>
                 </a:tc>
                 <a:extLst>
                   <a:ext uri="{0D108BD9-81ED-4DB2-BD59-A6C34878D82A}">
-                    <a16:rowId xmlns:a16="http://schemas.microsoft.com/office/drawing/2014/main" val="158354396"/>
+                    <a16:rowId xmlns:a16="http://schemas.microsoft.com/office/drawing/2014/main" val="4184940578"/>
                   </a:ext>
                 </a:extLst>
               </a:tr>
-              <a:tr h="370840">
+              <a:tr h="185420">
                 <a:tc>
                   <a:txBody>
                     <a:bodyPr/>
@@ -7271,7 +8630,24 @@
                       <a:endParaRPr lang="zh-CN" altLang="en-US" dirty="0"/>
                     </a:p>
                   </a:txBody>
-                  <a:tcPr/>
+                  <a:tcPr>
+                    <a:lnR w="12700" cap="flat" cmpd="sng" algn="ctr">
+                      <a:noFill/>
+                      <a:prstDash val="solid"/>
+                      <a:round/>
+                      <a:headEnd type="none" w="med" len="med"/>
+                      <a:tailEnd type="none" w="med" len="med"/>
+                    </a:lnR>
+                    <a:lnT w="12700" cap="flat" cmpd="sng" algn="ctr">
+                      <a:solidFill>
+                        <a:schemeClr val="tx1"/>
+                      </a:solidFill>
+                      <a:prstDash val="solid"/>
+                      <a:round/>
+                      <a:headEnd type="none" w="med" len="med"/>
+                      <a:tailEnd type="none" w="med" len="med"/>
+                    </a:lnT>
+                  </a:tcPr>
                 </a:tc>
                 <a:tc>
                   <a:txBody>
@@ -7296,17 +8672,38 @@
                         <a:defRPr/>
                       </a:pPr>
                       <a:r>
+                        <a:rPr lang="en-US" altLang="zh-CN" dirty="0" err="1"/>
+                        <a:t>u.openConnection</a:t>
+                      </a:r>
+                      <a:r>
                         <a:rPr lang="en-US" altLang="zh-CN" dirty="0"/>
-                        <a:t>u.openConnection();</a:t>
+                        <a:t>();</a:t>
                       </a:r>
                       <a:endParaRPr lang="zh-CN" altLang="en-US" dirty="0"/>
                     </a:p>
                   </a:txBody>
-                  <a:tcPr/>
+                  <a:tcPr>
+                    <a:lnL w="12700" cap="flat" cmpd="sng" algn="ctr">
+                      <a:noFill/>
+                      <a:prstDash val="solid"/>
+                      <a:round/>
+                      <a:headEnd type="none" w="med" len="med"/>
+                      <a:tailEnd type="none" w="med" len="med"/>
+                    </a:lnL>
+                    <a:lnT w="12700" cap="flat" cmpd="sng" algn="ctr">
+                      <a:solidFill>
+                        <a:schemeClr val="tx1"/>
+                      </a:solidFill>
+                      <a:prstDash val="solid"/>
+                      <a:round/>
+                      <a:headEnd type="none" w="med" len="med"/>
+                      <a:tailEnd type="none" w="med" len="med"/>
+                    </a:lnT>
+                  </a:tcPr>
                 </a:tc>
                 <a:extLst>
                   <a:ext uri="{0D108BD9-81ED-4DB2-BD59-A6C34878D82A}">
-                    <a16:rowId xmlns:a16="http://schemas.microsoft.com/office/drawing/2014/main" val="3578168134"/>
+                    <a16:rowId xmlns:a16="http://schemas.microsoft.com/office/drawing/2014/main" val="3587909672"/>
                   </a:ext>
                 </a:extLst>
               </a:tr>
@@ -7317,7 +8714,7 @@
     </p:spTree>
     <p:extLst>
       <p:ext uri="{BB962C8B-B14F-4D97-AF65-F5344CB8AC3E}">
-        <p14:creationId xmlns:p14="http://schemas.microsoft.com/office/powerpoint/2010/main" val="1195501673"/>
+        <p14:creationId xmlns:p14="http://schemas.microsoft.com/office/powerpoint/2010/main" val="2290414979"/>
       </p:ext>
     </p:extLst>
   </p:cSld>
@@ -7327,7 +8724,7 @@
 </p:sld>
 </file>
 
-<file path=ppt/slides/slide8.xml><?xml version="1.0" encoding="utf-8"?>
+<file path=ppt/slides/slide7.xml><?xml version="1.0" encoding="utf-8"?>
 <p:sld xmlns:a="http://schemas.openxmlformats.org/drawingml/2006/main" xmlns:r="http://schemas.openxmlformats.org/officeDocument/2006/relationships" xmlns:p="http://schemas.openxmlformats.org/presentationml/2006/main">
   <p:cSld>
     <p:spTree>
@@ -7365,7 +8762,7 @@
             <a:avLst/>
           </a:prstGeom>
           <a:noFill/>
-          <a:ln w="19050">
+          <a:ln w="12700">
             <a:solidFill>
               <a:schemeClr val="tx1"/>
             </a:solidFill>
@@ -7429,7 +8826,7 @@
           <a:prstGeom prst="rect">
             <a:avLst/>
           </a:prstGeom>
-          <a:ln w="19050">
+          <a:ln w="12700">
             <a:solidFill>
               <a:schemeClr val="tx1"/>
             </a:solidFill>
@@ -7487,7 +8884,7 @@
           <p:nvPr>
             <p:extLst>
               <p:ext uri="{D42A27DB-BD31-4B8C-83A1-F6EECF244321}">
-                <p14:modId xmlns:p14="http://schemas.microsoft.com/office/powerpoint/2010/main" val="415713978"/>
+                <p14:modId xmlns:p14="http://schemas.microsoft.com/office/powerpoint/2010/main" val="1219119410"/>
               </p:ext>
             </p:extLst>
           </p:nvPr>
@@ -7532,7 +8929,15 @@
                       <a:endParaRPr lang="zh-CN" altLang="en-US" dirty="0"/>
                     </a:p>
                   </a:txBody>
-                  <a:tcPr/>
+                  <a:tcPr>
+                    <a:lnR w="12700" cap="flat" cmpd="sng" algn="ctr">
+                      <a:noFill/>
+                      <a:prstDash val="solid"/>
+                      <a:round/>
+                      <a:headEnd type="none" w="med" len="med"/>
+                      <a:tailEnd type="none" w="med" len="med"/>
+                    </a:lnR>
+                  </a:tcPr>
                 </a:tc>
                 <a:tc>
                   <a:txBody>
@@ -7546,7 +8951,15 @@
                       <a:endParaRPr lang="zh-CN" altLang="en-US" dirty="0"/>
                     </a:p>
                   </a:txBody>
-                  <a:tcPr/>
+                  <a:tcPr>
+                    <a:lnL w="12700" cap="flat" cmpd="sng" algn="ctr">
+                      <a:noFill/>
+                      <a:prstDash val="solid"/>
+                      <a:round/>
+                      <a:headEnd type="none" w="med" len="med"/>
+                      <a:tailEnd type="none" w="med" len="med"/>
+                    </a:lnL>
+                  </a:tcPr>
                 </a:tc>
                 <a:extLst>
                   <a:ext uri="{0D108BD9-81ED-4DB2-BD59-A6C34878D82A}">
@@ -7568,7 +8981,15 @@
                       <a:endParaRPr lang="zh-CN" altLang="en-US" dirty="0"/>
                     </a:p>
                   </a:txBody>
-                  <a:tcPr/>
+                  <a:tcPr>
+                    <a:lnR w="12700" cap="flat" cmpd="sng" algn="ctr">
+                      <a:noFill/>
+                      <a:prstDash val="solid"/>
+                      <a:round/>
+                      <a:headEnd type="none" w="med" len="med"/>
+                      <a:tailEnd type="none" w="med" len="med"/>
+                    </a:lnR>
+                  </a:tcPr>
                 </a:tc>
                 <a:tc>
                   <a:txBody>
@@ -7599,7 +9020,15 @@
                       <a:endParaRPr lang="zh-CN" altLang="en-US" dirty="0"/>
                     </a:p>
                   </a:txBody>
-                  <a:tcPr/>
+                  <a:tcPr>
+                    <a:lnL w="12700" cap="flat" cmpd="sng" algn="ctr">
+                      <a:noFill/>
+                      <a:prstDash val="solid"/>
+                      <a:round/>
+                      <a:headEnd type="none" w="med" len="med"/>
+                      <a:tailEnd type="none" w="med" len="med"/>
+                    </a:lnL>
+                  </a:tcPr>
                 </a:tc>
                 <a:extLst>
                   <a:ext uri="{0D108BD9-81ED-4DB2-BD59-A6C34878D82A}">
@@ -7621,7 +9050,15 @@
                       <a:endParaRPr lang="zh-CN" altLang="en-US" dirty="0"/>
                     </a:p>
                   </a:txBody>
-                  <a:tcPr/>
+                  <a:tcPr>
+                    <a:lnR w="12700" cap="flat" cmpd="sng" algn="ctr">
+                      <a:noFill/>
+                      <a:prstDash val="solid"/>
+                      <a:round/>
+                      <a:headEnd type="none" w="med" len="med"/>
+                      <a:tailEnd type="none" w="med" len="med"/>
+                    </a:lnR>
+                  </a:tcPr>
                 </a:tc>
                 <a:tc>
                   <a:txBody>
@@ -7652,7 +9089,15 @@
                       <a:endParaRPr lang="zh-CN" altLang="en-US" dirty="0"/>
                     </a:p>
                   </a:txBody>
-                  <a:tcPr/>
+                  <a:tcPr>
+                    <a:lnL w="12700" cap="flat" cmpd="sng" algn="ctr">
+                      <a:noFill/>
+                      <a:prstDash val="solid"/>
+                      <a:round/>
+                      <a:headEnd type="none" w="med" len="med"/>
+                      <a:tailEnd type="none" w="med" len="med"/>
+                    </a:lnL>
+                  </a:tcPr>
                 </a:tc>
                 <a:extLst>
                   <a:ext uri="{0D108BD9-81ED-4DB2-BD59-A6C34878D82A}">
@@ -7674,7 +9119,15 @@
                       <a:endParaRPr lang="zh-CN" altLang="en-US" dirty="0"/>
                     </a:p>
                   </a:txBody>
-                  <a:tcPr/>
+                  <a:tcPr>
+                    <a:lnR w="12700" cap="flat" cmpd="sng" algn="ctr">
+                      <a:noFill/>
+                      <a:prstDash val="solid"/>
+                      <a:round/>
+                      <a:headEnd type="none" w="med" len="med"/>
+                      <a:tailEnd type="none" w="med" len="med"/>
+                    </a:lnR>
+                  </a:tcPr>
                 </a:tc>
                 <a:tc>
                   <a:txBody>
@@ -7705,7 +9158,15 @@
                       <a:endParaRPr lang="zh-CN" altLang="en-US" dirty="0"/>
                     </a:p>
                   </a:txBody>
-                  <a:tcPr/>
+                  <a:tcPr>
+                    <a:lnL w="12700" cap="flat" cmpd="sng" algn="ctr">
+                      <a:noFill/>
+                      <a:prstDash val="solid"/>
+                      <a:round/>
+                      <a:headEnd type="none" w="med" len="med"/>
+                      <a:tailEnd type="none" w="med" len="med"/>
+                    </a:lnL>
+                  </a:tcPr>
                 </a:tc>
                 <a:extLst>
                   <a:ext uri="{0D108BD9-81ED-4DB2-BD59-A6C34878D82A}">

</xml_diff>